<commit_message>
Added name to all Python slides
</commit_message>
<xml_diff>
--- a/python/presentations/handling_arrays/numpy.pptx
+++ b/python/presentations/handling_arrays/numpy.pptx
@@ -291,7 +291,7 @@
               <a:pPr>
                 <a:defRPr/>
               </a:pPr>
-              <a:t>09/10/2018</a:t>
+              <a:t>12/10/2018</a:t>
             </a:fld>
             <a:endParaRPr lang="en-GB" dirty="0"/>
           </a:p>
@@ -4052,7 +4052,7 @@
               <a:pPr>
                 <a:defRPr/>
               </a:pPr>
-              <a:t>09/10/2018</a:t>
+              <a:t>12/10/2018</a:t>
             </a:fld>
             <a:endParaRPr lang="en-GB" dirty="0"/>
           </a:p>
@@ -5273,14 +5273,7 @@
                 <a:latin typeface="+mn-lt"/>
                 <a:cs typeface="Calibri" panose="020F0502020204030204" pitchFamily="34" charset="0"/>
               </a:rPr>
-              <a:t>, Ag Stephens, Stephen Pascoe, Anabelle Guillory, Graham Parton, Esther </a:t>
-            </a:r>
-            <a:r>
-              <a:rPr lang="en-GB" sz="1400" dirty="0">
-                <a:latin typeface="+mn-lt"/>
-                <a:cs typeface="Calibri" panose="020F0502020204030204" pitchFamily="34" charset="0"/>
-              </a:rPr>
-              <a:t>Conway, </a:t>
+              <a:t>, Ag Stephens, Stephen Pascoe, Anabelle Guillory, Graham Parton, Esther Conway, </a:t>
             </a:r>
           </a:p>
           <a:p>
@@ -5300,15 +5293,19 @@
                 <a:latin typeface="+mn-lt"/>
                 <a:cs typeface="Calibri" panose="020F0502020204030204" pitchFamily="34" charset="0"/>
               </a:rPr>
-              <a:t>Wendy </a:t>
-            </a:r>
-            <a:r>
-              <a:rPr lang="en-GB" sz="1400" dirty="0">
+              <a:t>Wendy Garland, Alan </a:t>
+            </a:r>
+            <a:r>
+              <a:rPr lang="en-GB" sz="1400" dirty="0" smtClean="0">
                 <a:latin typeface="+mn-lt"/>
                 <a:cs typeface="Calibri" panose="020F0502020204030204" pitchFamily="34" charset="0"/>
               </a:rPr>
-              <a:t>Garland, Alan Iwi and Matt Pritchard.</a:t>
-            </a:r>
+              <a:t>Iwi, Matt Pritchard and Tommy Godfrey.</a:t>
+            </a:r>
+            <a:endParaRPr lang="en-GB" sz="1400" dirty="0">
+              <a:latin typeface="+mn-lt"/>
+              <a:cs typeface="Calibri" panose="020F0502020204030204" pitchFamily="34" charset="0"/>
+            </a:endParaRPr>
           </a:p>
         </p:txBody>
       </p:sp>
@@ -6729,35 +6726,7 @@
                 <a:latin typeface="Courier New" panose="02070309020205020404" pitchFamily="49" charset="0"/>
                 <a:cs typeface="Courier New" panose="02070309020205020404" pitchFamily="49" charset="0"/>
               </a:rPr>
-              <a:t>([[2, 3.2, 5.5, -6.4, -2.2, 2.4</a:t>
-            </a:r>
-            <a:r>
-              <a:rPr lang="en-GB" sz="2400" dirty="0">
-                <a:latin typeface="Courier New" panose="02070309020205020404" pitchFamily="49" charset="0"/>
-                <a:cs typeface="Courier New" panose="02070309020205020404" pitchFamily="49" charset="0"/>
-              </a:rPr>
-              <a:t>], [</a:t>
-            </a:r>
-            <a:r>
-              <a:rPr lang="en-GB" sz="2400" dirty="0">
-                <a:latin typeface="Courier New" panose="02070309020205020404" pitchFamily="49" charset="0"/>
-                <a:cs typeface="Courier New" panose="02070309020205020404" pitchFamily="49" charset="0"/>
-              </a:rPr>
-              <a:t>1, 22, 4, 0.1, 5.3, -9</a:t>
-            </a:r>
-            <a:r>
-              <a:rPr lang="en-GB" sz="2400" dirty="0">
-                <a:latin typeface="Courier New" panose="02070309020205020404" pitchFamily="49" charset="0"/>
-                <a:cs typeface="Courier New" panose="02070309020205020404" pitchFamily="49" charset="0"/>
-              </a:rPr>
-              <a:t>],                  [</a:t>
-            </a:r>
-            <a:r>
-              <a:rPr lang="en-GB" sz="2400" dirty="0">
-                <a:latin typeface="Courier New" panose="02070309020205020404" pitchFamily="49" charset="0"/>
-                <a:cs typeface="Courier New" panose="02070309020205020404" pitchFamily="49" charset="0"/>
-              </a:rPr>
-              <a:t>3, 1, 2.1, 21, 1.1, -2]])</a:t>
+              <a:t>([[2, 3.2, 5.5, -6.4, -2.2, 2.4], [1, 22, 4, 0.1, 5.3, -9],                  [3, 1, 2.1, 21, 1.1, -2]])</a:t>
             </a:r>
           </a:p>
         </p:txBody>
@@ -10426,14 +10395,7 @@
                 <a:latin typeface="Courier New" panose="02070309020205020404" pitchFamily="49" charset="0"/>
                 <a:cs typeface="Courier New" panose="02070309020205020404" pitchFamily="49" charset="0"/>
               </a:rPr>
-              <a:t>([[2, 3.2, 5.5, -6.4</a:t>
-            </a:r>
-            <a:r>
-              <a:rPr lang="en-GB" sz="2000" dirty="0">
-                <a:latin typeface="Courier New" panose="02070309020205020404" pitchFamily="49" charset="0"/>
-                <a:cs typeface="Courier New" panose="02070309020205020404" pitchFamily="49" charset="0"/>
-              </a:rPr>
-              <a:t>],</a:t>
+              <a:t>([[2, 3.2, 5.5, -6.4],</a:t>
             </a:r>
           </a:p>
           <a:p>
@@ -10457,14 +10419,7 @@
                 <a:latin typeface="Courier New" panose="02070309020205020404" pitchFamily="49" charset="0"/>
                 <a:cs typeface="Courier New" panose="02070309020205020404" pitchFamily="49" charset="0"/>
               </a:rPr>
-              <a:t>b </a:t>
-            </a:r>
-            <a:r>
-              <a:rPr lang="en-GB" sz="2000" dirty="0">
-                <a:latin typeface="Courier New" panose="02070309020205020404" pitchFamily="49" charset="0"/>
-                <a:cs typeface="Courier New" panose="02070309020205020404" pitchFamily="49" charset="0"/>
-              </a:rPr>
-              <a:t>= </a:t>
+              <a:t>b = </a:t>
             </a:r>
             <a:r>
               <a:rPr lang="en-GB" sz="2000" dirty="0" err="1">
@@ -10646,35 +10601,21 @@
                 <a:latin typeface="Courier New" panose="02070309020205020404" pitchFamily="49" charset="0"/>
                 <a:cs typeface="Courier New" panose="02070309020205020404" pitchFamily="49" charset="0"/>
               </a:rPr>
-              <a:t> </a:t>
+              <a:t> range(</a:t>
+            </a:r>
+            <a:r>
+              <a:rPr lang="en-GB" sz="2000" dirty="0" err="1">
+                <a:latin typeface="Courier New" panose="02070309020205020404" pitchFamily="49" charset="0"/>
+                <a:cs typeface="Courier New" panose="02070309020205020404" pitchFamily="49" charset="0"/>
+              </a:rPr>
+              <a:t>shape_a</a:t>
             </a:r>
             <a:r>
               <a:rPr lang="en-GB" sz="2000" dirty="0">
                 <a:latin typeface="Courier New" panose="02070309020205020404" pitchFamily="49" charset="0"/>
                 <a:cs typeface="Courier New" panose="02070309020205020404" pitchFamily="49" charset="0"/>
               </a:rPr>
-              <a:t>range(</a:t>
-            </a:r>
-            <a:r>
-              <a:rPr lang="en-GB" sz="2000" dirty="0" err="1">
-                <a:latin typeface="Courier New" panose="02070309020205020404" pitchFamily="49" charset="0"/>
-                <a:cs typeface="Courier New" panose="02070309020205020404" pitchFamily="49" charset="0"/>
-              </a:rPr>
-              <a:t>shape_a</a:t>
-            </a:r>
-            <a:r>
-              <a:rPr lang="en-GB" sz="2000" dirty="0">
-                <a:latin typeface="Courier New" panose="02070309020205020404" pitchFamily="49" charset="0"/>
-                <a:cs typeface="Courier New" panose="02070309020205020404" pitchFamily="49" charset="0"/>
-              </a:rPr>
-              <a:t>[0</a:t>
-            </a:r>
-            <a:r>
-              <a:rPr lang="en-GB" sz="2000" dirty="0">
-                <a:latin typeface="Courier New" panose="02070309020205020404" pitchFamily="49" charset="0"/>
-                <a:cs typeface="Courier New" panose="02070309020205020404" pitchFamily="49" charset="0"/>
-              </a:rPr>
-              <a:t>]):</a:t>
+              <a:t>[0]):</a:t>
             </a:r>
           </a:p>
           <a:p>
@@ -10714,35 +10655,21 @@
                 <a:latin typeface="Courier New" panose="02070309020205020404" pitchFamily="49" charset="0"/>
                 <a:cs typeface="Courier New" panose="02070309020205020404" pitchFamily="49" charset="0"/>
               </a:rPr>
-              <a:t> </a:t>
+              <a:t> range(</a:t>
+            </a:r>
+            <a:r>
+              <a:rPr lang="en-GB" sz="2000" dirty="0" err="1">
+                <a:latin typeface="Courier New" panose="02070309020205020404" pitchFamily="49" charset="0"/>
+                <a:cs typeface="Courier New" panose="02070309020205020404" pitchFamily="49" charset="0"/>
+              </a:rPr>
+              <a:t>shape_a</a:t>
             </a:r>
             <a:r>
               <a:rPr lang="en-GB" sz="2000" dirty="0">
                 <a:latin typeface="Courier New" panose="02070309020205020404" pitchFamily="49" charset="0"/>
                 <a:cs typeface="Courier New" panose="02070309020205020404" pitchFamily="49" charset="0"/>
               </a:rPr>
-              <a:t>range(</a:t>
-            </a:r>
-            <a:r>
-              <a:rPr lang="en-GB" sz="2000" dirty="0" err="1">
-                <a:latin typeface="Courier New" panose="02070309020205020404" pitchFamily="49" charset="0"/>
-                <a:cs typeface="Courier New" panose="02070309020205020404" pitchFamily="49" charset="0"/>
-              </a:rPr>
-              <a:t>shape_a</a:t>
-            </a:r>
-            <a:r>
-              <a:rPr lang="en-GB" sz="2000" dirty="0">
-                <a:latin typeface="Courier New" panose="02070309020205020404" pitchFamily="49" charset="0"/>
-                <a:cs typeface="Courier New" panose="02070309020205020404" pitchFamily="49" charset="0"/>
-              </a:rPr>
-              <a:t>[1</a:t>
-            </a:r>
-            <a:r>
-              <a:rPr lang="en-GB" sz="2000" dirty="0">
-                <a:latin typeface="Courier New" panose="02070309020205020404" pitchFamily="49" charset="0"/>
-                <a:cs typeface="Courier New" panose="02070309020205020404" pitchFamily="49" charset="0"/>
-              </a:rPr>
-              <a:t>]):</a:t>
+              <a:t>[1]):</a:t>
             </a:r>
           </a:p>
           <a:p>
@@ -12690,11 +12617,7 @@
             </a:pPr>
             <a:r>
               <a:rPr lang="en-GB" sz="2800" b="1" dirty="0"/>
-              <a:t>It's </a:t>
-            </a:r>
-            <a:r>
-              <a:rPr lang="en-GB" sz="2800" b="1" dirty="0"/>
-              <a:t>a one liner!</a:t>
+              <a:t>It's a one liner!</a:t>
             </a:r>
           </a:p>
         </p:txBody>

</xml_diff>

<commit_message>
Modified title as per comments
</commit_message>
<xml_diff>
--- a/python/presentations/handling_arrays/numpy.pptx
+++ b/python/presentations/handling_arrays/numpy.pptx
@@ -289,7 +289,7 @@
               <a:pPr>
                 <a:defRPr/>
               </a:pPr>
-              <a:t>05/11/2018</a:t>
+              <a:t>06/11/2018</a:t>
             </a:fld>
             <a:endParaRPr lang="en-GB" dirty="0"/>
           </a:p>
@@ -3902,7 +3902,7 @@
               <a:pPr>
                 <a:defRPr/>
               </a:pPr>
-              <a:t>05/11/2018</a:t>
+              <a:t>06/11/2018</a:t>
             </a:fld>
             <a:endParaRPr lang="en-GB" dirty="0"/>
           </a:p>
@@ -10066,14 +10066,7 @@
           <a:p>
             <a:r>
               <a:rPr lang="en-US" altLang="en-US" b="1" dirty="0"/>
-              <a:t>General array operations:</a:t>
-            </a:r>
-            <a:br>
-              <a:rPr lang="en-US" altLang="en-US" b="1" dirty="0"/>
-            </a:br>
-            <a:r>
-              <a:rPr lang="en-US" altLang="en-US" b="1" dirty="0"/>
-              <a:t>Element by Element Multiplication</a:t>
+              <a:t>General array operations</a:t>
             </a:r>
             <a:br>
               <a:rPr lang="en-US" altLang="en-US" b="1" dirty="0"/>
@@ -11026,14 +11019,7 @@
           <a:p>
             <a:r>
               <a:rPr lang="en-US" altLang="en-US" b="1" dirty="0"/>
-              <a:t>General array operations:</a:t>
-            </a:r>
-            <a:br>
-              <a:rPr lang="en-US" altLang="en-US" b="1" dirty="0"/>
-            </a:br>
-            <a:r>
-              <a:rPr lang="en-US" altLang="en-US" b="1" dirty="0"/>
-              <a:t>Element by Element Multiplication</a:t>
+              <a:t>General array operations</a:t>
             </a:r>
           </a:p>
         </p:txBody>

</xml_diff>

<commit_message>
handling_arrays, numpy presentation: Fixed url to book and mentioned it is Python2
</commit_message>
<xml_diff>
--- a/python/presentations/handling_arrays/numpy.pptx
+++ b/python/presentations/handling_arrays/numpy.pptx
@@ -289,7 +289,7 @@
               <a:pPr>
                 <a:defRPr/>
               </a:pPr>
-              <a:t>06/11/2018</a:t>
+              <a:t>18/12/2018</a:t>
             </a:fld>
             <a:endParaRPr lang="en-GB" dirty="0"/>
           </a:p>
@@ -3902,7 +3902,7 @@
               <a:pPr>
                 <a:defRPr/>
               </a:pPr>
-              <a:t>06/11/2018</a:t>
+              <a:t>18/12/2018</a:t>
             </a:fld>
             <a:endParaRPr lang="en-GB" dirty="0"/>
           </a:p>
@@ -8356,20 +8356,20 @@
               <a:buNone/>
             </a:pPr>
             <a:r>
-              <a:rPr lang="en-US" altLang="en-US" sz="2800">
+              <a:rPr lang="en-US" altLang="en-US" sz="2800" dirty="0">
                 <a:cs typeface="Calibri" panose="020F0502020204030204" pitchFamily="34" charset="0"/>
               </a:rPr>
               <a:t>Arrays have methods or attributes, including equivalents of the more commonly used </a:t>
             </a:r>
             <a:r>
-              <a:rPr lang="en-US" altLang="en-US" sz="2800">
+              <a:rPr lang="en-US" altLang="en-US" sz="2800" dirty="0">
                 <a:latin typeface="Courier New" panose="02070309020205020404" pitchFamily="49" charset="0"/>
                 <a:cs typeface="Courier New" panose="02070309020205020404" pitchFamily="49" charset="0"/>
               </a:rPr>
               <a:t>np.………</a:t>
             </a:r>
             <a:r>
-              <a:rPr lang="en-US" altLang="en-US" sz="2800">
+              <a:rPr lang="en-US" altLang="en-US" sz="2800" dirty="0">
                 <a:cs typeface="Calibri" panose="020F0502020204030204" pitchFamily="34" charset="0"/>
               </a:rPr>
               <a:t> functions, e.g.:</a:t>
@@ -8387,36 +8387,51 @@
               <a:buNone/>
             </a:pPr>
             <a:r>
-              <a:rPr lang="en-US" altLang="en-US" sz="2800">
+              <a:rPr lang="en-US" altLang="en-US" sz="2800" dirty="0">
                 <a:latin typeface="Courier New" panose="02070309020205020404" pitchFamily="49" charset="0"/>
                 <a:cs typeface="Courier New" panose="02070309020205020404" pitchFamily="49" charset="0"/>
               </a:rPr>
               <a:t>   </a:t>
             </a:r>
             <a:r>
-              <a:rPr lang="en-US" altLang="en-US" sz="2800" b="1">
+              <a:rPr lang="en-US" altLang="en-US" sz="2800" b="1" dirty="0" err="1">
                 <a:latin typeface="Courier New" panose="02070309020205020404" pitchFamily="49" charset="0"/>
                 <a:cs typeface="Courier New" panose="02070309020205020404" pitchFamily="49" charset="0"/>
                 <a:sym typeface="Wingdings" panose="05000000000000000000" pitchFamily="2" charset="2"/>
               </a:rPr>
-              <a:t>a.shape     </a:t>
-            </a:r>
-            <a:r>
-              <a:rPr lang="en-US" altLang="en-US" sz="2800">
+              <a:t>a.shape</a:t>
+            </a:r>
+            <a:r>
+              <a:rPr lang="en-US" altLang="en-US" sz="2800" b="1" dirty="0">
                 <a:latin typeface="Courier New" panose="02070309020205020404" pitchFamily="49" charset="0"/>
                 <a:cs typeface="Courier New" panose="02070309020205020404" pitchFamily="49" charset="0"/>
                 <a:sym typeface="Wingdings" panose="05000000000000000000" pitchFamily="2" charset="2"/>
               </a:rPr>
+              <a:t>     </a:t>
+            </a:r>
+            <a:r>
+              <a:rPr lang="en-US" altLang="en-US" sz="2800" dirty="0">
+                <a:latin typeface="Courier New" panose="02070309020205020404" pitchFamily="49" charset="0"/>
+                <a:cs typeface="Courier New" panose="02070309020205020404" pitchFamily="49" charset="0"/>
+                <a:sym typeface="Wingdings" panose="05000000000000000000" pitchFamily="2" charset="2"/>
+              </a:rPr>
               <a:t>  </a:t>
             </a:r>
             <a:r>
-              <a:rPr lang="en-US" altLang="en-US" sz="2800">
-                <a:latin typeface="Courier New" panose="02070309020205020404" pitchFamily="49" charset="0"/>
-                <a:cs typeface="Courier New" panose="02070309020205020404" pitchFamily="49" charset="0"/>
-              </a:rPr>
-              <a:t>np.shape(a)</a:t>
-            </a:r>
-            <a:endParaRPr lang="en-US" altLang="en-US" sz="2800" b="1">
+              <a:rPr lang="en-US" altLang="en-US" sz="2800" dirty="0" err="1">
+                <a:latin typeface="Courier New" panose="02070309020205020404" pitchFamily="49" charset="0"/>
+                <a:cs typeface="Courier New" panose="02070309020205020404" pitchFamily="49" charset="0"/>
+              </a:rPr>
+              <a:t>np.shape</a:t>
+            </a:r>
+            <a:r>
+              <a:rPr lang="en-US" altLang="en-US" sz="2800" dirty="0">
+                <a:latin typeface="Courier New" panose="02070309020205020404" pitchFamily="49" charset="0"/>
+                <a:cs typeface="Courier New" panose="02070309020205020404" pitchFamily="49" charset="0"/>
+              </a:rPr>
+              <a:t>(a)</a:t>
+            </a:r>
+            <a:endParaRPr lang="en-US" altLang="en-US" sz="2800" b="1" dirty="0">
               <a:latin typeface="Courier New" panose="02070309020205020404" pitchFamily="49" charset="0"/>
               <a:cs typeface="Courier New" panose="02070309020205020404" pitchFamily="49" charset="0"/>
               <a:sym typeface="Wingdings" panose="05000000000000000000" pitchFamily="2" charset="2"/>
@@ -8434,7 +8449,7 @@
               <a:buNone/>
             </a:pPr>
             <a:r>
-              <a:rPr lang="en-US" altLang="en-US" sz="2800">
+              <a:rPr lang="en-US" altLang="en-US" sz="2800" dirty="0">
                 <a:latin typeface="Courier New" panose="02070309020205020404" pitchFamily="49" charset="0"/>
                 <a:cs typeface="Courier New" panose="02070309020205020404" pitchFamily="49" charset="0"/>
                 <a:sym typeface="Wingdings" panose="05000000000000000000" pitchFamily="2" charset="2"/>
@@ -8442,7 +8457,7 @@
               <a:t>   </a:t>
             </a:r>
             <a:r>
-              <a:rPr lang="en-US" altLang="en-US" sz="2800" b="1">
+              <a:rPr lang="en-US" altLang="en-US" sz="2800" b="1" dirty="0" err="1">
                 <a:latin typeface="Courier New" panose="02070309020205020404" pitchFamily="49" charset="0"/>
                 <a:cs typeface="Courier New" panose="02070309020205020404" pitchFamily="49" charset="0"/>
                 <a:sym typeface="Wingdings" panose="05000000000000000000" pitchFamily="2" charset="2"/>
@@ -8450,12 +8465,28 @@
               <a:t>a.max</a:t>
             </a:r>
             <a:r>
-              <a:rPr lang="en-US" altLang="en-US" sz="2800">
+              <a:rPr lang="en-US" altLang="en-US" sz="2800" dirty="0">
                 <a:latin typeface="Courier New" panose="02070309020205020404" pitchFamily="49" charset="0"/>
                 <a:cs typeface="Courier New" panose="02070309020205020404" pitchFamily="49" charset="0"/>
                 <a:sym typeface="Wingdings" panose="05000000000000000000" pitchFamily="2" charset="2"/>
               </a:rPr>
-              <a:t>()       np.max(a)</a:t>
+              <a:t>()       </a:t>
+            </a:r>
+            <a:r>
+              <a:rPr lang="en-US" altLang="en-US" sz="2800" dirty="0" err="1">
+                <a:latin typeface="Courier New" panose="02070309020205020404" pitchFamily="49" charset="0"/>
+                <a:cs typeface="Courier New" panose="02070309020205020404" pitchFamily="49" charset="0"/>
+                <a:sym typeface="Wingdings" panose="05000000000000000000" pitchFamily="2" charset="2"/>
+              </a:rPr>
+              <a:t>np.max</a:t>
+            </a:r>
+            <a:r>
+              <a:rPr lang="en-US" altLang="en-US" sz="2800" dirty="0">
+                <a:latin typeface="Courier New" panose="02070309020205020404" pitchFamily="49" charset="0"/>
+                <a:cs typeface="Courier New" panose="02070309020205020404" pitchFamily="49" charset="0"/>
+                <a:sym typeface="Wingdings" panose="05000000000000000000" pitchFamily="2" charset="2"/>
+              </a:rPr>
+              <a:t>(a)</a:t>
             </a:r>
           </a:p>
           <a:p>
@@ -8470,7 +8501,7 @@
               <a:buNone/>
             </a:pPr>
             <a:r>
-              <a:rPr lang="en-US" altLang="en-US" sz="2800">
+              <a:rPr lang="en-US" altLang="en-US" sz="2800" dirty="0">
                 <a:latin typeface="Courier New" panose="02070309020205020404" pitchFamily="49" charset="0"/>
                 <a:cs typeface="Courier New" panose="02070309020205020404" pitchFamily="49" charset="0"/>
                 <a:sym typeface="Wingdings" panose="05000000000000000000" pitchFamily="2" charset="2"/>
@@ -8478,7 +8509,7 @@
               <a:t>   </a:t>
             </a:r>
             <a:r>
-              <a:rPr lang="en-US" altLang="en-US" sz="2800" b="1">
+              <a:rPr lang="en-US" altLang="en-US" sz="2800" b="1" dirty="0" err="1">
                 <a:latin typeface="Courier New" panose="02070309020205020404" pitchFamily="49" charset="0"/>
                 <a:cs typeface="Courier New" panose="02070309020205020404" pitchFamily="49" charset="0"/>
                 <a:sym typeface="Wingdings" panose="05000000000000000000" pitchFamily="2" charset="2"/>
@@ -8486,29 +8517,53 @@
               <a:t>a.repeat</a:t>
             </a:r>
             <a:r>
-              <a:rPr lang="en-US" altLang="en-US" sz="2800">
+              <a:rPr lang="en-US" altLang="en-US" sz="2800" dirty="0">
                 <a:latin typeface="Courier New" panose="02070309020205020404" pitchFamily="49" charset="0"/>
                 <a:cs typeface="Courier New" panose="02070309020205020404" pitchFamily="49" charset="0"/>
                 <a:sym typeface="Wingdings" panose="05000000000000000000" pitchFamily="2" charset="2"/>
               </a:rPr>
-              <a:t>(3)   np.repeat(a,3)</a:t>
+              <a:t>(3)   </a:t>
+            </a:r>
+            <a:r>
+              <a:rPr lang="en-US" altLang="en-US" sz="2800" dirty="0" err="1">
+                <a:latin typeface="Courier New" panose="02070309020205020404" pitchFamily="49" charset="0"/>
+                <a:cs typeface="Courier New" panose="02070309020205020404" pitchFamily="49" charset="0"/>
+                <a:sym typeface="Wingdings" panose="05000000000000000000" pitchFamily="2" charset="2"/>
+              </a:rPr>
+              <a:t>np.repeat</a:t>
+            </a:r>
+            <a:r>
+              <a:rPr lang="en-US" altLang="en-US" sz="2800" dirty="0">
+                <a:latin typeface="Courier New" panose="02070309020205020404" pitchFamily="49" charset="0"/>
+                <a:cs typeface="Courier New" panose="02070309020205020404" pitchFamily="49" charset="0"/>
+                <a:sym typeface="Wingdings" panose="05000000000000000000" pitchFamily="2" charset="2"/>
+              </a:rPr>
+              <a:t>(a,3)</a:t>
             </a:r>
             <a:br>
-              <a:rPr lang="en-US" altLang="en-US" sz="2800">
+              <a:rPr lang="en-US" altLang="en-US" sz="2800" dirty="0">
                 <a:latin typeface="Courier New" panose="02070309020205020404" pitchFamily="49" charset="0"/>
                 <a:cs typeface="Courier New" panose="02070309020205020404" pitchFamily="49" charset="0"/>
                 <a:sym typeface="Wingdings" panose="05000000000000000000" pitchFamily="2" charset="2"/>
               </a:rPr>
             </a:br>
+            <a:r>
+              <a:rPr lang="en-US" altLang="en-US" sz="1400" dirty="0">
+                <a:latin typeface="Courier New" panose="02070309020205020404" pitchFamily="49" charset="0"/>
+                <a:cs typeface="Courier New" panose="02070309020205020404" pitchFamily="49" charset="0"/>
+                <a:sym typeface="Wingdings" panose="05000000000000000000" pitchFamily="2" charset="2"/>
+              </a:rPr>
+              <a:t/>
+            </a:r>
             <a:br>
-              <a:rPr lang="en-US" altLang="en-US" sz="1400">
+              <a:rPr lang="en-US" altLang="en-US" sz="1400" dirty="0">
                 <a:latin typeface="Courier New" panose="02070309020205020404" pitchFamily="49" charset="0"/>
                 <a:cs typeface="Courier New" panose="02070309020205020404" pitchFamily="49" charset="0"/>
                 <a:sym typeface="Wingdings" panose="05000000000000000000" pitchFamily="2" charset="2"/>
               </a:rPr>
             </a:br>
             <a:r>
-              <a:rPr lang="en-US" altLang="en-US" sz="2800">
+              <a:rPr lang="en-US" altLang="en-US" sz="2800" dirty="0">
                 <a:cs typeface="Calibri" panose="020F0502020204030204" pitchFamily="34" charset="0"/>
               </a:rPr>
               <a:t>as well as various others, e.g.:</a:t>
@@ -8526,7 +8581,7 @@
               <a:buNone/>
             </a:pPr>
             <a:r>
-              <a:rPr lang="en-US" altLang="en-US" sz="2800">
+              <a:rPr lang="en-US" altLang="en-US" sz="2800" dirty="0">
                 <a:latin typeface="Courier New" panose="02070309020205020404" pitchFamily="49" charset="0"/>
                 <a:cs typeface="Courier New" panose="02070309020205020404" pitchFamily="49" charset="0"/>
                 <a:sym typeface="Wingdings" panose="05000000000000000000" pitchFamily="2" charset="2"/>
@@ -8534,7 +8589,7 @@
               <a:t>  </a:t>
             </a:r>
             <a:r>
-              <a:rPr lang="en-US" altLang="en-US" sz="2800" b="1">
+              <a:rPr lang="en-US" altLang="en-US" sz="2800" b="1" dirty="0" err="1">
                 <a:latin typeface="Courier New" panose="02070309020205020404" pitchFamily="49" charset="0"/>
                 <a:cs typeface="Courier New" panose="02070309020205020404" pitchFamily="49" charset="0"/>
                 <a:sym typeface="Wingdings" panose="05000000000000000000" pitchFamily="2" charset="2"/>
@@ -8542,7 +8597,7 @@
               <a:t>a.dtype</a:t>
             </a:r>
             <a:r>
-              <a:rPr lang="en-US" altLang="en-US" sz="2800">
+              <a:rPr lang="en-US" altLang="en-US" sz="2800" dirty="0">
                 <a:latin typeface="Courier New" panose="02070309020205020404" pitchFamily="49" charset="0"/>
                 <a:cs typeface="Courier New" panose="02070309020205020404" pitchFamily="49" charset="0"/>
                 <a:sym typeface="Wingdings" panose="05000000000000000000" pitchFamily="2" charset="2"/>
@@ -8550,27 +8605,34 @@
               <a:t> </a:t>
             </a:r>
             <a:r>
-              <a:rPr lang="en-US" altLang="en-US" sz="2800">
+              <a:rPr lang="en-US" altLang="en-US" sz="2800" dirty="0">
                 <a:cs typeface="Courier New" panose="02070309020205020404" pitchFamily="49" charset="0"/>
                 <a:sym typeface="Wingdings" panose="05000000000000000000" pitchFamily="2" charset="2"/>
               </a:rPr>
               <a:t> </a:t>
             </a:r>
             <a:r>
-              <a:rPr lang="en-US" altLang="en-US" sz="2800" i="1">
+              <a:rPr lang="en-US" altLang="en-US" sz="2800" i="1" dirty="0">
                 <a:cs typeface="Courier New" panose="02070309020205020404" pitchFamily="49" charset="0"/>
                 <a:sym typeface="Wingdings" panose="05000000000000000000" pitchFamily="2" charset="2"/>
               </a:rPr>
               <a:t>interrogate data type</a:t>
             </a:r>
+            <a:r>
+              <a:rPr lang="en-US" altLang="en-US" i="1" dirty="0">
+                <a:cs typeface="Courier New" panose="02070309020205020404" pitchFamily="49" charset="0"/>
+                <a:sym typeface="Wingdings" panose="05000000000000000000" pitchFamily="2" charset="2"/>
+              </a:rPr>
+              <a:t/>
+            </a:r>
             <a:br>
-              <a:rPr lang="en-US" altLang="en-US" i="1">
+              <a:rPr lang="en-US" altLang="en-US" i="1" dirty="0">
                 <a:cs typeface="Courier New" panose="02070309020205020404" pitchFamily="49" charset="0"/>
                 <a:sym typeface="Wingdings" panose="05000000000000000000" pitchFamily="2" charset="2"/>
               </a:rPr>
             </a:br>
             <a:r>
-              <a:rPr lang="en-US" altLang="en-US" sz="2800">
+              <a:rPr lang="en-US" altLang="en-US" sz="2800" dirty="0">
                 <a:latin typeface="Courier New" panose="02070309020205020404" pitchFamily="49" charset="0"/>
                 <a:cs typeface="Courier New" panose="02070309020205020404" pitchFamily="49" charset="0"/>
                 <a:sym typeface="Wingdings" panose="05000000000000000000" pitchFamily="2" charset="2"/>
@@ -8578,7 +8640,7 @@
               <a:t>  b = </a:t>
             </a:r>
             <a:r>
-              <a:rPr lang="en-US" altLang="en-US" sz="2800" b="1">
+              <a:rPr lang="en-US" altLang="en-US" sz="2800" b="1" dirty="0" err="1">
                 <a:latin typeface="Courier New" panose="02070309020205020404" pitchFamily="49" charset="0"/>
                 <a:cs typeface="Courier New" panose="02070309020205020404" pitchFamily="49" charset="0"/>
                 <a:sym typeface="Wingdings" panose="05000000000000000000" pitchFamily="2" charset="2"/>
@@ -8586,7 +8648,7 @@
               <a:t>a.astype</a:t>
             </a:r>
             <a:r>
-              <a:rPr lang="en-US" altLang="en-US" sz="2800">
+              <a:rPr lang="en-US" altLang="en-US" sz="2800" dirty="0">
                 <a:latin typeface="Courier New" panose="02070309020205020404" pitchFamily="49" charset="0"/>
                 <a:cs typeface="Courier New" panose="02070309020205020404" pitchFamily="49" charset="0"/>
                 <a:sym typeface="Wingdings" panose="05000000000000000000" pitchFamily="2" charset="2"/>
@@ -8594,53 +8656,60 @@
               <a:t>(np.int32) </a:t>
             </a:r>
             <a:r>
-              <a:rPr lang="en-US" altLang="en-US" sz="2800">
+              <a:rPr lang="en-US" altLang="en-US" sz="2800" dirty="0">
                 <a:cs typeface="Courier New" panose="02070309020205020404" pitchFamily="49" charset="0"/>
                 <a:sym typeface="Wingdings" panose="05000000000000000000" pitchFamily="2" charset="2"/>
               </a:rPr>
               <a:t> </a:t>
             </a:r>
             <a:r>
-              <a:rPr lang="en-US" altLang="en-US" sz="2800" i="1">
+              <a:rPr lang="en-US" altLang="en-US" sz="2800" i="1" dirty="0">
                 <a:cs typeface="Courier New" panose="02070309020205020404" pitchFamily="49" charset="0"/>
                 <a:sym typeface="Wingdings" panose="05000000000000000000" pitchFamily="2" charset="2"/>
               </a:rPr>
               <a:t>convert data type</a:t>
             </a:r>
             <a:br>
-              <a:rPr lang="en-US" altLang="en-US" sz="2800" i="1">
+              <a:rPr lang="en-US" altLang="en-US" sz="2800" i="1" dirty="0">
                 <a:cs typeface="Courier New" panose="02070309020205020404" pitchFamily="49" charset="0"/>
                 <a:sym typeface="Wingdings" panose="05000000000000000000" pitchFamily="2" charset="2"/>
               </a:rPr>
             </a:br>
+            <a:r>
+              <a:rPr lang="en-US" altLang="en-US" i="1" dirty="0">
+                <a:cs typeface="Courier New" panose="02070309020205020404" pitchFamily="49" charset="0"/>
+                <a:sym typeface="Wingdings" panose="05000000000000000000" pitchFamily="2" charset="2"/>
+              </a:rPr>
+              <a:t/>
+            </a:r>
             <a:br>
-              <a:rPr lang="en-US" altLang="en-US" i="1">
+              <a:rPr lang="en-US" altLang="en-US" i="1" dirty="0">
                 <a:cs typeface="Courier New" panose="02070309020205020404" pitchFamily="49" charset="0"/>
                 <a:sym typeface="Wingdings" panose="05000000000000000000" pitchFamily="2" charset="2"/>
               </a:rPr>
             </a:br>
             <a:r>
-              <a:rPr lang="en-US" altLang="en-US" sz="2800">
+              <a:rPr lang="en-US" altLang="en-US" sz="2800" dirty="0">
                 <a:cs typeface="Calibri" panose="020F0502020204030204" pitchFamily="34" charset="0"/>
                 <a:sym typeface="Wingdings" panose="05000000000000000000" pitchFamily="2" charset="2"/>
               </a:rPr>
               <a:t>although </a:t>
             </a:r>
             <a:r>
-              <a:rPr lang="en-US" altLang="en-US" sz="2800">
+              <a:rPr lang="en-US" altLang="en-US" sz="2800" dirty="0">
                 <a:cs typeface="Calibri" panose="020F0502020204030204" pitchFamily="34" charset="0"/>
               </a:rPr>
               <a:t>much else exists only as </a:t>
             </a:r>
             <a:r>
-              <a:rPr lang="en-US" altLang="en-US" sz="2800">
+              <a:rPr lang="en-US" altLang="en-US" sz="2800" dirty="0">
                 <a:latin typeface="Courier New" panose="02070309020205020404" pitchFamily="49" charset="0"/>
                 <a:cs typeface="Courier New" panose="02070309020205020404" pitchFamily="49" charset="0"/>
               </a:rPr>
               <a:t>np.………</a:t>
             </a:r>
             <a:r>
-              <a:rPr lang="en-US" altLang="en-US" sz="2800">
+              <a:rPr lang="en-US" altLang="en-US" sz="2800" dirty="0">
                 <a:cs typeface="Calibri" panose="020F0502020204030204" pitchFamily="34" charset="0"/>
               </a:rPr>
               <a:t> , e.g.</a:t>
@@ -8658,27 +8727,41 @@
               <a:buNone/>
             </a:pPr>
             <a:r>
-              <a:rPr lang="en-US" altLang="en-US" sz="2800">
-                <a:latin typeface="Courier New" panose="02070309020205020404" pitchFamily="49" charset="0"/>
-                <a:cs typeface="Courier New" panose="02070309020205020404" pitchFamily="49" charset="0"/>
-              </a:rPr>
-              <a:t>   np.average(a) </a:t>
-            </a:r>
-            <a:r>
-              <a:rPr lang="en-US" altLang="en-US" sz="2800">
+              <a:rPr lang="en-US" altLang="en-US" sz="2800" dirty="0">
+                <a:latin typeface="Courier New" panose="02070309020205020404" pitchFamily="49" charset="0"/>
+                <a:cs typeface="Courier New" panose="02070309020205020404" pitchFamily="49" charset="0"/>
+              </a:rPr>
+              <a:t>   </a:t>
+            </a:r>
+            <a:r>
+              <a:rPr lang="en-US" altLang="en-US" sz="2800" dirty="0" err="1">
+                <a:latin typeface="Courier New" panose="02070309020205020404" pitchFamily="49" charset="0"/>
+                <a:cs typeface="Courier New" panose="02070309020205020404" pitchFamily="49" charset="0"/>
+              </a:rPr>
+              <a:t>np.average</a:t>
+            </a:r>
+            <a:r>
+              <a:rPr lang="en-US" altLang="en-US" sz="2800" dirty="0">
+                <a:latin typeface="Courier New" panose="02070309020205020404" pitchFamily="49" charset="0"/>
+                <a:cs typeface="Courier New" panose="02070309020205020404" pitchFamily="49" charset="0"/>
+              </a:rPr>
+              <a:t>(a) </a:t>
+            </a:r>
+            <a:r>
+              <a:rPr lang="en-US" altLang="en-US" sz="2800" dirty="0">
                 <a:cs typeface="Calibri" panose="020F0502020204030204" pitchFamily="34" charset="0"/>
               </a:rPr>
               <a:t> </a:t>
             </a:r>
             <a:r>
-              <a:rPr lang="en-US" altLang="en-US" sz="2800">
+              <a:rPr lang="en-US" altLang="en-US" sz="2800" dirty="0">
                 <a:cs typeface="Calibri" panose="020F0502020204030204" pitchFamily="34" charset="0"/>
                 <a:sym typeface="Wingdings" panose="05000000000000000000" pitchFamily="2" charset="2"/>
               </a:rPr>
               <a:t> </a:t>
             </a:r>
             <a:r>
-              <a:rPr lang="en-US" altLang="en-US" sz="2800" i="1">
+              <a:rPr lang="en-US" altLang="en-US" sz="2800" i="1" dirty="0" err="1">
                 <a:latin typeface="Courier New" panose="02070309020205020404" pitchFamily="49" charset="0"/>
                 <a:cs typeface="Courier New" panose="02070309020205020404" pitchFamily="49" charset="0"/>
                 <a:sym typeface="Wingdings" panose="05000000000000000000" pitchFamily="2" charset="2"/>
@@ -8686,13 +8769,13 @@
               <a:t>a.average</a:t>
             </a:r>
             <a:r>
-              <a:rPr lang="en-US" altLang="en-US" sz="2800" i="1">
+              <a:rPr lang="en-US" altLang="en-US" sz="2800" i="1" dirty="0">
                 <a:cs typeface="Calibri" panose="020F0502020204030204" pitchFamily="34" charset="0"/>
                 <a:sym typeface="Wingdings" panose="05000000000000000000" pitchFamily="2" charset="2"/>
               </a:rPr>
               <a:t> doesn't exist</a:t>
             </a:r>
-            <a:endParaRPr lang="en-US" altLang="en-US" sz="2800" i="1">
+            <a:endParaRPr lang="en-US" altLang="en-US" sz="2800" i="1" dirty="0">
               <a:cs typeface="Calibri" panose="020F0502020204030204" pitchFamily="34" charset="0"/>
             </a:endParaRPr>
           </a:p>
@@ -10434,12 +10517,32 @@
               <a:buNone/>
             </a:pPr>
             <a:r>
-              <a:rPr lang="en-GB" altLang="en-US" sz="2800" b="1"/>
+              <a:rPr lang="en-GB" altLang="en-US" sz="2800" b="1" dirty="0"/>
               <a:t>Johnny Lin</a:t>
             </a:r>
             <a:r>
-              <a:rPr lang="en-GB" altLang="en-US" sz="2800"/>
-              <a:t> writes a great python/atmospheric science blog with exercises, examples, presentations, books etc.</a:t>
+              <a:rPr lang="en-GB" altLang="en-US" sz="2800" dirty="0"/>
+              <a:t> </a:t>
+            </a:r>
+            <a:r>
+              <a:rPr lang="en-GB" altLang="en-US" sz="2800" dirty="0" smtClean="0"/>
+              <a:t>wrote </a:t>
+            </a:r>
+            <a:r>
+              <a:rPr lang="en-GB" altLang="en-US" sz="2800" dirty="0"/>
+              <a:t>a great python/atmospheric science </a:t>
+            </a:r>
+            <a:r>
+              <a:rPr lang="en-GB" altLang="en-US" sz="2800" dirty="0" smtClean="0"/>
+              <a:t>book </a:t>
+            </a:r>
+            <a:r>
+              <a:rPr lang="en-GB" altLang="en-US" sz="2800" dirty="0"/>
+              <a:t>with exercises, examples, presentations, books etc</a:t>
+            </a:r>
+            <a:r>
+              <a:rPr lang="en-GB" altLang="en-US" sz="2800" dirty="0" smtClean="0"/>
+              <a:t>.</a:t>
             </a:r>
           </a:p>
           <a:p>
@@ -10447,7 +10550,18 @@
               <a:buFont typeface="Arial" panose="020B0604020202020204" pitchFamily="34" charset="0"/>
               <a:buNone/>
             </a:pPr>
-            <a:endParaRPr lang="en-GB" altLang="en-US" sz="2800">
+            <a:r>
+              <a:rPr lang="en-GB" altLang="en-US" sz="2800" dirty="0" smtClean="0"/>
+              <a:t>It is Python 2 however.</a:t>
+            </a:r>
+            <a:endParaRPr lang="en-GB" altLang="en-US" sz="2800" dirty="0"/>
+          </a:p>
+          <a:p>
+            <a:pPr marL="0" indent="0">
+              <a:buFont typeface="Arial" panose="020B0604020202020204" pitchFamily="34" charset="0"/>
+              <a:buNone/>
+            </a:pPr>
+            <a:endParaRPr lang="en-GB" altLang="en-US" sz="2800" dirty="0">
               <a:cs typeface="Courier New" panose="02070309020205020404" pitchFamily="49" charset="0"/>
             </a:endParaRPr>
           </a:p>
@@ -10457,23 +10571,23 @@
               <a:buNone/>
             </a:pPr>
             <a:r>
-              <a:rPr lang="en-GB" altLang="en-US" sz="2800">
+              <a:rPr lang="en-GB" altLang="en-US" sz="2800" dirty="0">
                 <a:cs typeface="Courier New" panose="02070309020205020404" pitchFamily="49" charset="0"/>
               </a:rPr>
               <a:t>Much of this is borrowed </a:t>
             </a:r>
             <a:br>
-              <a:rPr lang="en-GB" altLang="en-US" sz="2800">
+              <a:rPr lang="en-GB" altLang="en-US" sz="2800" dirty="0">
                 <a:cs typeface="Courier New" panose="02070309020205020404" pitchFamily="49" charset="0"/>
               </a:rPr>
             </a:br>
             <a:r>
-              <a:rPr lang="en-GB" altLang="en-US" sz="2800">
+              <a:rPr lang="en-GB" altLang="en-US" sz="2800" dirty="0">
                 <a:cs typeface="Courier New" panose="02070309020205020404" pitchFamily="49" charset="0"/>
               </a:rPr>
               <a:t>from...</a:t>
             </a:r>
-            <a:endParaRPr lang="en-GB" altLang="en-US" sz="2800"/>
+            <a:endParaRPr lang="en-GB" altLang="en-US" sz="2800" dirty="0"/>
           </a:p>
         </p:txBody>
       </p:sp>
@@ -10956,17 +11070,23 @@
               <a:spcBef>
                 <a:spcPct val="20000"/>
               </a:spcBef>
-              <a:buFont typeface="Arial" panose="020B0604020202020204" pitchFamily="34" charset="0"/>
               <a:buNone/>
             </a:pPr>
             <a:r>
-              <a:rPr lang="en-GB" altLang="en-US" sz="3200">
+              <a:rPr lang="en-GB" altLang="en-US" sz="3200" dirty="0">
                 <a:cs typeface="Calibri" panose="020F0502020204030204" pitchFamily="34" charset="0"/>
                 <a:hlinkClick r:id="rId3"/>
               </a:rPr>
-              <a:t>http://pyaos.johnny-lin.com/?p=1256</a:t>
-            </a:r>
-            <a:endParaRPr lang="en-GB" altLang="en-US" sz="3200">
+              <a:t>https://www.johnny-lin.com/pyintro</a:t>
+            </a:r>
+            <a:r>
+              <a:rPr lang="en-GB" altLang="en-US" sz="3200" dirty="0" smtClean="0">
+                <a:cs typeface="Calibri" panose="020F0502020204030204" pitchFamily="34" charset="0"/>
+                <a:hlinkClick r:id="rId3"/>
+              </a:rPr>
+              <a:t>/</a:t>
+            </a:r>
+            <a:endParaRPr lang="en-GB" altLang="en-US" sz="3200" dirty="0">
               <a:cs typeface="Calibri" panose="020F0502020204030204" pitchFamily="34" charset="0"/>
             </a:endParaRPr>
           </a:p>
@@ -14824,6 +14944,12 @@
                 <a:cs typeface="Calibri" panose="020F0502020204030204" pitchFamily="34" charset="0"/>
               </a:rPr>
             </a:br>
+            <a:r>
+              <a:rPr lang="en-US" altLang="en-US" sz="2800">
+                <a:cs typeface="Calibri" panose="020F0502020204030204" pitchFamily="34" charset="0"/>
+              </a:rPr>
+              <a:t/>
+            </a:r>
             <a:br>
               <a:rPr lang="en-US" altLang="en-US" sz="2800">
                 <a:cs typeface="Calibri" panose="020F0502020204030204" pitchFamily="34" charset="0"/>
@@ -19476,17 +19602,25 @@
               </a:lnSpc>
             </a:pPr>
             <a:r>
-              <a:rPr lang="en-US" altLang="en-US" sz="2800">
+              <a:rPr lang="en-US" altLang="en-US" sz="2800" dirty="0" err="1">
                 <a:latin typeface="Courier New" panose="02070309020205020404" pitchFamily="49" charset="0"/>
                 <a:cs typeface="Courier New" panose="02070309020205020404" pitchFamily="49" charset="0"/>
               </a:rPr>
               <a:t>NumPy</a:t>
             </a:r>
             <a:r>
-              <a:rPr lang="en-US" altLang="en-US" sz="2800"/>
-              <a:t> is a powerful array handling package that provides the array handling functionality of IDL, Matlab, Fortran 90 etc.</a:t>
-            </a:r>
-            <a:endParaRPr lang="en-US" altLang="en-US" sz="2800">
+              <a:rPr lang="en-US" altLang="en-US" sz="2800" dirty="0"/>
+              <a:t> is a powerful array handling package that provides the array handling functionality of IDL, </a:t>
+            </a:r>
+            <a:r>
+              <a:rPr lang="en-US" altLang="en-US" sz="2800" dirty="0" err="1"/>
+              <a:t>Matlab</a:t>
+            </a:r>
+            <a:r>
+              <a:rPr lang="en-US" altLang="en-US" sz="2800" dirty="0"/>
+              <a:t>, Fortran 90 etc.</a:t>
+            </a:r>
+            <a:endParaRPr lang="en-US" altLang="en-US" sz="2800" dirty="0">
               <a:cs typeface="Calibri" panose="020F0502020204030204" pitchFamily="34" charset="0"/>
             </a:endParaRPr>
           </a:p>
@@ -19500,7 +19634,7 @@
               </a:spcBef>
             </a:pPr>
             <a:r>
-              <a:rPr lang="en-US" altLang="en-US" sz="2800"/>
+              <a:rPr lang="en-US" altLang="en-US" sz="2800" dirty="0"/>
               <a:t>Array syntax enables you to write more streamlined and flexible code: The same code can handle operations on arrays of arbitrary rank.</a:t>
             </a:r>
           </a:p>
@@ -19514,7 +19648,7 @@
               </a:spcBef>
             </a:pPr>
             <a:r>
-              <a:rPr lang="en-US" altLang="en-US" sz="2800">
+              <a:rPr lang="en-US" altLang="en-US" sz="2800" dirty="0">
                 <a:cs typeface="Calibri" panose="020F0502020204030204" pitchFamily="34" charset="0"/>
               </a:rPr>
               <a:t>Masked arrays extend the functionality by providing support for "bad values".</a:t>

</xml_diff>

<commit_message>
adding a reminder of the last slide for masked arrays as there is no way you'd remember and don't want to have to switch
</commit_message>
<xml_diff>
--- a/python/presentations/handling_arrays/numpy.pptx
+++ b/python/presentations/handling_arrays/numpy.pptx
@@ -289,7 +289,7 @@
               <a:pPr>
                 <a:defRPr/>
               </a:pPr>
-              <a:t>21/11/2019</a:t>
+              <a:t>22/10/2021</a:t>
             </a:fld>
             <a:endParaRPr lang="en-GB" dirty="0"/>
           </a:p>
@@ -3902,7 +3902,7 @@
               <a:pPr>
                 <a:defRPr/>
               </a:pPr>
-              <a:t>21/11/2019</a:t>
+              <a:t>22/10/2021</a:t>
             </a:fld>
             <a:endParaRPr lang="en-GB" dirty="0"/>
           </a:p>
@@ -5153,13 +5153,6 @@
   <p:clrMapOvr>
     <a:masterClrMapping/>
   </p:clrMapOvr>
-  <p:timing>
-    <p:tnLst>
-      <p:par>
-        <p:cTn id="1" dur="indefinite" restart="never" nodeType="tmRoot"/>
-      </p:par>
-    </p:tnLst>
-  </p:timing>
 </p:sld>
 </file>
 
@@ -5540,13 +5533,6 @@
   <p:transition>
     <p:cut/>
   </p:transition>
-  <p:timing>
-    <p:tnLst>
-      <p:par>
-        <p:cTn id="1" dur="indefinite" restart="never" nodeType="tmRoot"/>
-      </p:par>
-    </p:tnLst>
-  </p:timing>
 </p:sld>
 </file>
 
@@ -6195,13 +6181,6 @@
   <p:transition>
     <p:cut/>
   </p:transition>
-  <p:timing>
-    <p:tnLst>
-      <p:par>
-        <p:cTn id="1" dur="indefinite" restart="never" nodeType="tmRoot"/>
-      </p:par>
-    </p:tnLst>
-  </p:timing>
 </p:sld>
 </file>
 
@@ -8116,13 +8095,6 @@
   <p:transition>
     <p:cut/>
   </p:transition>
-  <p:timing>
-    <p:tnLst>
-      <p:par>
-        <p:cTn id="1" dur="indefinite" restart="never" nodeType="tmRoot"/>
-      </p:par>
-    </p:tnLst>
-  </p:timing>
 </p:sld>
 </file>
 
@@ -8575,14 +8547,6 @@
                 <a:sym typeface="Wingdings" panose="05000000000000000000" pitchFamily="2" charset="2"/>
               </a:rPr>
             </a:br>
-            <a:r>
-              <a:rPr lang="en-US" altLang="en-US" sz="1400" dirty="0">
-                <a:latin typeface="Courier New" panose="02070309020205020404" pitchFamily="49" charset="0"/>
-                <a:cs typeface="Courier New" panose="02070309020205020404" pitchFamily="49" charset="0"/>
-                <a:sym typeface="Wingdings" panose="05000000000000000000" pitchFamily="2" charset="2"/>
-              </a:rPr>
-              <a:t/>
-            </a:r>
             <a:br>
               <a:rPr lang="en-US" altLang="en-US" sz="1400" dirty="0">
                 <a:latin typeface="Courier New" panose="02070309020205020404" pitchFamily="49" charset="0"/>
@@ -8646,13 +8610,6 @@
               </a:rPr>
               <a:t>interrogate data type</a:t>
             </a:r>
-            <a:r>
-              <a:rPr lang="en-US" altLang="en-US" i="1" dirty="0">
-                <a:cs typeface="Courier New" panose="02070309020205020404" pitchFamily="49" charset="0"/>
-                <a:sym typeface="Wingdings" panose="05000000000000000000" pitchFamily="2" charset="2"/>
-              </a:rPr>
-              <a:t/>
-            </a:r>
             <a:br>
               <a:rPr lang="en-US" altLang="en-US" i="1" dirty="0">
                 <a:cs typeface="Courier New" panose="02070309020205020404" pitchFamily="49" charset="0"/>
@@ -8703,13 +8660,6 @@
                 <a:sym typeface="Wingdings" panose="05000000000000000000" pitchFamily="2" charset="2"/>
               </a:rPr>
             </a:br>
-            <a:r>
-              <a:rPr lang="en-US" altLang="en-US" i="1" dirty="0">
-                <a:cs typeface="Courier New" panose="02070309020205020404" pitchFamily="49" charset="0"/>
-                <a:sym typeface="Wingdings" panose="05000000000000000000" pitchFamily="2" charset="2"/>
-              </a:rPr>
-              <a:t/>
-            </a:r>
             <a:br>
               <a:rPr lang="en-US" altLang="en-US" i="1" dirty="0">
                 <a:cs typeface="Courier New" panose="02070309020205020404" pitchFamily="49" charset="0"/>
@@ -8879,13 +8829,6 @@
   <p:transition>
     <p:cut/>
   </p:transition>
-  <p:timing>
-    <p:tnLst>
-      <p:par>
-        <p:cTn id="1" dur="indefinite" restart="never" nodeType="tmRoot"/>
-      </p:par>
-    </p:tnLst>
-  </p:timing>
 </p:sld>
 </file>
 
@@ -10142,13 +10085,6 @@
   <p:clrMapOvr>
     <a:masterClrMapping/>
   </p:clrMapOvr>
-  <p:timing>
-    <p:tnLst>
-      <p:par>
-        <p:cTn id="1" dur="indefinite" restart="never" nodeType="tmRoot"/>
-      </p:par>
-    </p:tnLst>
-  </p:timing>
 </p:sld>
 </file>
 
@@ -10492,13 +10428,6 @@
   <p:transition>
     <p:cut/>
   </p:transition>
-  <p:timing>
-    <p:tnLst>
-      <p:par>
-        <p:cTn id="1" dur="indefinite" restart="never" nodeType="tmRoot"/>
-      </p:par>
-    </p:tnLst>
-  </p:timing>
 </p:sld>
 </file>
 
@@ -10571,27 +10500,7 @@
             </a:r>
             <a:r>
               <a:rPr lang="en-GB" altLang="en-US" sz="2800" dirty="0"/>
-              <a:t> </a:t>
-            </a:r>
-            <a:r>
-              <a:rPr lang="en-GB" altLang="en-US" sz="2800" dirty="0" smtClean="0"/>
-              <a:t>wrote </a:t>
-            </a:r>
-            <a:r>
-              <a:rPr lang="en-GB" altLang="en-US" sz="2800" dirty="0"/>
-              <a:t>a great python/atmospheric science </a:t>
-            </a:r>
-            <a:r>
-              <a:rPr lang="en-GB" altLang="en-US" sz="2800" dirty="0" smtClean="0"/>
-              <a:t>book </a:t>
-            </a:r>
-            <a:r>
-              <a:rPr lang="en-GB" altLang="en-US" sz="2800" dirty="0"/>
-              <a:t>with exercises, examples, presentations, books etc</a:t>
-            </a:r>
-            <a:r>
-              <a:rPr lang="en-GB" altLang="en-US" sz="2800" dirty="0" smtClean="0"/>
-              <a:t>.</a:t>
+              <a:t> wrote a great python/atmospheric science book with exercises, examples, presentations, books etc.</a:t>
             </a:r>
           </a:p>
           <a:p>
@@ -10600,10 +10509,9 @@
               <a:buNone/>
             </a:pPr>
             <a:r>
-              <a:rPr lang="en-GB" altLang="en-US" sz="2800" dirty="0" smtClean="0"/>
+              <a:rPr lang="en-GB" altLang="en-US" sz="2800" dirty="0"/>
               <a:t>It is Python 2 however.</a:t>
             </a:r>
-            <a:endParaRPr lang="en-GB" altLang="en-US" sz="2800" dirty="0"/>
           </a:p>
           <a:p>
             <a:pPr marL="0" indent="0">
@@ -11126,14 +11034,7 @@
                 <a:cs typeface="Calibri" panose="020F0502020204030204" pitchFamily="34" charset="0"/>
                 <a:hlinkClick r:id="rId3"/>
               </a:rPr>
-              <a:t>https://www.johnny-lin.com/pyintro</a:t>
-            </a:r>
-            <a:r>
-              <a:rPr lang="en-GB" altLang="en-US" sz="3200" dirty="0" smtClean="0">
-                <a:cs typeface="Calibri" panose="020F0502020204030204" pitchFamily="34" charset="0"/>
-                <a:hlinkClick r:id="rId3"/>
-              </a:rPr>
-              <a:t>/</a:t>
+              <a:t>https://www.johnny-lin.com/pyintro/</a:t>
             </a:r>
             <a:endParaRPr lang="en-GB" altLang="en-US" sz="3200" dirty="0">
               <a:cs typeface="Calibri" panose="020F0502020204030204" pitchFamily="34" charset="0"/>
@@ -11146,13 +11047,6 @@
   <p:clrMapOvr>
     <a:masterClrMapping/>
   </p:clrMapOvr>
-  <p:timing>
-    <p:tnLst>
-      <p:par>
-        <p:cTn id="1" dur="indefinite" restart="never" nodeType="tmRoot"/>
-      </p:par>
-    </p:tnLst>
-  </p:timing>
 </p:sld>
 </file>
 
@@ -12189,13 +12083,6 @@
   <p:transition>
     <p:cut/>
   </p:transition>
-  <p:timing>
-    <p:tnLst>
-      <p:par>
-        <p:cTn id="1" dur="indefinite" restart="never" nodeType="tmRoot"/>
-      </p:par>
-    </p:tnLst>
-  </p:timing>
 </p:sld>
 </file>
 
@@ -12784,13 +12671,6 @@
   <p:transition>
     <p:cut/>
   </p:transition>
-  <p:timing>
-    <p:tnLst>
-      <p:par>
-        <p:cTn id="1" dur="indefinite" restart="never" nodeType="tmRoot"/>
-      </p:par>
-    </p:tnLst>
-  </p:timing>
 </p:sld>
 </file>
 
@@ -13438,13 +13318,6 @@
   <p:transition>
     <p:cut/>
   </p:transition>
-  <p:timing>
-    <p:tnLst>
-      <p:par>
-        <p:cTn id="1" dur="indefinite" restart="never" nodeType="tmRoot"/>
-      </p:par>
-    </p:tnLst>
-  </p:timing>
 </p:sld>
 </file>
 
@@ -13812,13 +13685,6 @@
   <p:transition>
     <p:cut/>
   </p:transition>
-  <p:timing>
-    <p:tnLst>
-      <p:par>
-        <p:cTn id="1" dur="indefinite" restart="never" nodeType="tmRoot"/>
-      </p:par>
-    </p:tnLst>
-  </p:timing>
 </p:sld>
 </file>
 
@@ -14223,13 +14089,6 @@
   <p:transition>
     <p:cut/>
   </p:transition>
-  <p:timing>
-    <p:tnLst>
-      <p:par>
-        <p:cTn id="1" dur="indefinite" restart="never" nodeType="tmRoot"/>
-      </p:par>
-    </p:tnLst>
-  </p:timing>
 </p:sld>
 </file>
 
@@ -14293,13 +14152,6 @@
   <p:transition>
     <p:cut/>
   </p:transition>
-  <p:timing>
-    <p:tnLst>
-      <p:par>
-        <p:cTn id="1" dur="indefinite" restart="never" nodeType="tmRoot"/>
-      </p:par>
-    </p:tnLst>
-  </p:timing>
 </p:sld>
 </file>
 
@@ -14685,13 +14537,6 @@
   <p:transition>
     <p:cut/>
   </p:transition>
-  <p:timing>
-    <p:tnLst>
-      <p:par>
-        <p:cTn id="1" dur="indefinite" restart="never" nodeType="tmRoot"/>
-      </p:par>
-    </p:tnLst>
-  </p:timing>
 </p:sld>
 </file>
 
@@ -14783,13 +14628,6 @@
   <p:transition>
     <p:cut/>
   </p:transition>
-  <p:timing>
-    <p:tnLst>
-      <p:par>
-        <p:cTn id="1" dur="indefinite" restart="never" nodeType="tmRoot"/>
-      </p:par>
-    </p:tnLst>
-  </p:timing>
 </p:sld>
 </file>
 
@@ -15056,12 +14894,6 @@
                 <a:cs typeface="Calibri" panose="020F0502020204030204" pitchFamily="34" charset="0"/>
               </a:rPr>
             </a:br>
-            <a:r>
-              <a:rPr lang="en-US" altLang="en-US" sz="2800">
-                <a:cs typeface="Calibri" panose="020F0502020204030204" pitchFamily="34" charset="0"/>
-              </a:rPr>
-              <a:t/>
-            </a:r>
             <a:br>
               <a:rPr lang="en-US" altLang="en-US" sz="2800">
                 <a:cs typeface="Calibri" panose="020F0502020204030204" pitchFamily="34" charset="0"/>
@@ -15431,13 +15263,6 @@
   <p:transition>
     <p:cut/>
   </p:transition>
-  <p:timing>
-    <p:tnLst>
-      <p:par>
-        <p:cTn id="1" dur="indefinite" restart="never" nodeType="tmRoot"/>
-      </p:par>
-    </p:tnLst>
-  </p:timing>
 </p:sld>
 </file>
 
@@ -17159,13 +16984,6 @@
   <p:transition>
     <p:cut/>
   </p:transition>
-  <p:timing>
-    <p:tnLst>
-      <p:par>
-        <p:cTn id="1" dur="indefinite" restart="never" nodeType="tmRoot"/>
-      </p:par>
-    </p:tnLst>
-  </p:timing>
 </p:sld>
 </file>
 
@@ -17216,15 +17034,7 @@
             </a:pPr>
             <a:r>
               <a:rPr lang="en-GB" sz="4000" b="1" spc="-109" dirty="0"/>
-              <a:t>Constructing Masked </a:t>
-            </a:r>
-            <a:r>
-              <a:rPr lang="en-GB" sz="4000" b="1" spc="-109" dirty="0" smtClean="0"/>
-              <a:t>Arrays </a:t>
-            </a:r>
-            <a:r>
-              <a:rPr lang="en-GB" sz="4000" b="1" spc="-109" dirty="0"/>
-              <a:t>3</a:t>
+              <a:t>Constructing Masked Arrays 3</a:t>
             </a:r>
             <a:endParaRPr sz="4000" b="1" spc="-287" dirty="0"/>
           </a:p>
@@ -17877,13 +17687,6 @@
   <p:transition>
     <p:cut/>
   </p:transition>
-  <p:timing>
-    <p:tnLst>
-      <p:par>
-        <p:cTn id="1" dur="indefinite" restart="never" nodeType="tmRoot"/>
-      </p:par>
-    </p:tnLst>
-  </p:timing>
 </p:sld>
 </file>
 
@@ -18743,6 +18546,58 @@
           </a:graphicData>
         </a:graphic>
       </p:graphicFrame>
+      <p:sp>
+        <p:nvSpPr>
+          <p:cNvPr id="2" name="TextBox 1">
+            <a:extLst>
+              <a:ext uri="{FF2B5EF4-FFF2-40B4-BE49-F238E27FC236}">
+                <a16:creationId xmlns:a16="http://schemas.microsoft.com/office/drawing/2014/main" id="{6C75AB4E-7840-A745-8A7C-3F89C7221A0F}"/>
+              </a:ext>
+            </a:extLst>
+          </p:cNvPr>
+          <p:cNvSpPr txBox="1"/>
+          <p:nvPr/>
+        </p:nvSpPr>
+        <p:spPr>
+          <a:xfrm>
+            <a:off x="251520" y="2152651"/>
+            <a:ext cx="1672253" cy="923330"/>
+          </a:xfrm>
+          <a:prstGeom prst="rect">
+            <a:avLst/>
+          </a:prstGeom>
+          <a:noFill/>
+          <a:ln w="28575">
+            <a:solidFill>
+              <a:srgbClr val="00B0F0"/>
+            </a:solidFill>
+          </a:ln>
+        </p:spPr>
+        <p:txBody>
+          <a:bodyPr wrap="none" rtlCol="0">
+            <a:spAutoFit/>
+          </a:bodyPr>
+          <a:lstStyle/>
+          <a:p>
+            <a:r>
+              <a:rPr lang="en-GB" dirty="0"/>
+              <a:t>Masked when:</a:t>
+            </a:r>
+          </a:p>
+          <a:p>
+            <a:r>
+              <a:rPr lang="en-GB" dirty="0"/>
+              <a:t>b &gt; 3</a:t>
+            </a:r>
+          </a:p>
+          <a:p>
+            <a:r>
+              <a:rPr lang="en-GB" dirty="0"/>
+              <a:t>c &gt; 2, c &lt; 5</a:t>
+            </a:r>
+          </a:p>
+        </p:txBody>
+      </p:sp>
     </p:spTree>
   </p:cSld>
   <p:clrMapOvr>
@@ -18751,13 +18606,6 @@
   <p:transition>
     <p:cut/>
   </p:transition>
-  <p:timing>
-    <p:tnLst>
-      <p:par>
-        <p:cTn id="1" dur="indefinite" restart="never" nodeType="tmRoot"/>
-      </p:par>
-    </p:tnLst>
-  </p:timing>
 </p:sld>
 </file>
 
@@ -19632,35 +19480,7 @@
                 <a:latin typeface="Courier New" panose="02070309020205020404" pitchFamily="49" charset="0"/>
                 <a:cs typeface="Courier New" panose="02070309020205020404" pitchFamily="49" charset="0"/>
               </a:rPr>
-              <a:t>(data</a:t>
-            </a:r>
-            <a:r>
-              <a:rPr lang="en-GB" sz="2400" spc="99" dirty="0" smtClean="0">
-                <a:latin typeface="Courier New" panose="02070309020205020404" pitchFamily="49" charset="0"/>
-                <a:cs typeface="Courier New" panose="02070309020205020404" pitchFamily="49" charset="0"/>
-              </a:rPr>
-              <a:t>=...,</a:t>
-            </a:r>
-            <a:r>
-              <a:rPr lang="en-GB" sz="2400" spc="99" dirty="0">
-                <a:latin typeface="Courier New" panose="02070309020205020404" pitchFamily="49" charset="0"/>
-                <a:cs typeface="Courier New" panose="02070309020205020404" pitchFamily="49" charset="0"/>
-              </a:rPr>
-              <a:t>mask</a:t>
-            </a:r>
-            <a:r>
-              <a:rPr lang="en-GB" sz="2400" spc="99" dirty="0" smtClean="0">
-                <a:latin typeface="Courier New" panose="02070309020205020404" pitchFamily="49" charset="0"/>
-                <a:cs typeface="Courier New" panose="02070309020205020404" pitchFamily="49" charset="0"/>
-              </a:rPr>
-              <a:t>=...,</a:t>
-            </a:r>
-            <a:r>
-              <a:rPr lang="en-GB" sz="2400" spc="99" dirty="0">
-                <a:latin typeface="Courier New" panose="02070309020205020404" pitchFamily="49" charset="0"/>
-                <a:cs typeface="Courier New" panose="02070309020205020404" pitchFamily="49" charset="0"/>
-              </a:rPr>
-              <a:t/>
+              <a:t>(data=...,mask=...,</a:t>
             </a:r>
             <a:br>
               <a:rPr lang="en-GB" sz="2400" spc="99" dirty="0">
@@ -19710,13 +19530,6 @@
   <p:transition>
     <p:cut/>
   </p:transition>
-  <p:timing>
-    <p:tnLst>
-      <p:par>
-        <p:cTn id="1" dur="indefinite" restart="never" nodeType="tmRoot"/>
-      </p:par>
-    </p:tnLst>
-  </p:timing>
 </p:sld>
 </file>
 
@@ -19841,13 +19654,7 @@
               <a:rPr lang="en-US" altLang="en-US" sz="2800" dirty="0">
                 <a:cs typeface="Calibri" panose="020F0502020204030204" pitchFamily="34" charset="0"/>
               </a:rPr>
-              <a:t>Masked arrays extend the functionality by providing support for "bad values</a:t>
-            </a:r>
-            <a:r>
-              <a:rPr lang="en-US" altLang="en-US" sz="2800" dirty="0" smtClean="0">
-                <a:cs typeface="Calibri" panose="020F0502020204030204" pitchFamily="34" charset="0"/>
-              </a:rPr>
-              <a:t>".</a:t>
+              <a:t>Masked arrays extend the functionality by providing support for "bad values".</a:t>
             </a:r>
           </a:p>
           <a:p>
@@ -19860,26 +19667,23 @@
               </a:spcBef>
             </a:pPr>
             <a:r>
-              <a:rPr lang="en-US" altLang="en-US" sz="2800" dirty="0" smtClean="0">
+              <a:rPr lang="en-US" altLang="en-US" sz="2800" dirty="0">
                 <a:cs typeface="Calibri" panose="020F0502020204030204" pitchFamily="34" charset="0"/>
               </a:rPr>
               <a:t>Other libraries, such as Pandas, netCDF4, cf-python, iris and Xarray all use </a:t>
             </a:r>
             <a:r>
-              <a:rPr lang="en-US" altLang="en-US" sz="2800" dirty="0" err="1" smtClean="0">
+              <a:rPr lang="en-US" altLang="en-US" sz="2800" dirty="0" err="1">
                 <a:cs typeface="Calibri" panose="020F0502020204030204" pitchFamily="34" charset="0"/>
               </a:rPr>
               <a:t>NumPy</a:t>
             </a:r>
             <a:r>
-              <a:rPr lang="en-US" altLang="en-US" sz="2800" dirty="0" smtClean="0">
+              <a:rPr lang="en-US" altLang="en-US" sz="2800" dirty="0">
                 <a:cs typeface="Calibri" panose="020F0502020204030204" pitchFamily="34" charset="0"/>
               </a:rPr>
               <a:t>.</a:t>
             </a:r>
-            <a:endParaRPr lang="en-US" altLang="en-US" sz="2800" dirty="0">
-              <a:cs typeface="Calibri" panose="020F0502020204030204" pitchFamily="34" charset="0"/>
-            </a:endParaRPr>
           </a:p>
         </p:txBody>
       </p:sp>
@@ -19891,13 +19695,6 @@
   <p:transition>
     <p:cut/>
   </p:transition>
-  <p:timing>
-    <p:tnLst>
-      <p:par>
-        <p:cTn id="1" dur="indefinite" restart="never" nodeType="tmRoot"/>
-      </p:par>
-    </p:tnLst>
-  </p:timing>
 </p:sld>
 </file>
 
@@ -20426,13 +20223,6 @@
   <p:transition>
     <p:cut/>
   </p:transition>
-  <p:timing>
-    <p:tnLst>
-      <p:par>
-        <p:cTn id="1" dur="indefinite" restart="never" nodeType="tmRoot"/>
-      </p:par>
-    </p:tnLst>
-  </p:timing>
 </p:sld>
 </file>
 
@@ -20655,13 +20445,6 @@
   <p:transition>
     <p:cut/>
   </p:transition>
-  <p:timing>
-    <p:tnLst>
-      <p:par>
-        <p:cTn id="1" dur="indefinite" restart="never" nodeType="tmRoot"/>
-      </p:par>
-    </p:tnLst>
-  </p:timing>
 </p:sld>
 </file>
 
@@ -20808,13 +20591,6 @@
   <p:transition>
     <p:cut/>
   </p:transition>
-  <p:timing>
-    <p:tnLst>
-      <p:par>
-        <p:cTn id="1" dur="indefinite" restart="never" nodeType="tmRoot"/>
-      </p:par>
-    </p:tnLst>
-  </p:timing>
 </p:sld>
 </file>
 
@@ -21318,13 +21094,6 @@
   <p:transition>
     <p:cut/>
   </p:transition>
-  <p:timing>
-    <p:tnLst>
-      <p:par>
-        <p:cTn id="1" dur="indefinite" restart="never" nodeType="tmRoot"/>
-      </p:par>
-    </p:tnLst>
-  </p:timing>
 </p:sld>
 </file>
 
@@ -22452,13 +22221,6 @@
   <p:transition>
     <p:cut/>
   </p:transition>
-  <p:timing>
-    <p:tnLst>
-      <p:par>
-        <p:cTn id="1" dur="indefinite" restart="never" nodeType="tmRoot"/>
-      </p:par>
-    </p:tnLst>
-  </p:timing>
 </p:sld>
 </file>
 

</xml_diff>

<commit_message>
numpy talk minor tweaks
</commit_message>
<xml_diff>
--- a/python/presentations/handling_arrays/numpy.pptx
+++ b/python/presentations/handling_arrays/numpy.pptx
@@ -288,7 +288,7 @@
               <a:pPr>
                 <a:defRPr/>
               </a:pPr>
-              <a:t>18/11/2021</a:t>
+              <a:t>19/11/2021</a:t>
             </a:fld>
             <a:endParaRPr lang="en-GB" dirty="0"/>
           </a:p>
@@ -3827,7 +3827,7 @@
               <a:pPr>
                 <a:defRPr/>
               </a:pPr>
-              <a:t>18/11/2021</a:t>
+              <a:t>19/11/2021</a:t>
             </a:fld>
             <a:endParaRPr lang="en-GB" dirty="0"/>
           </a:p>
@@ -5078,6 +5078,13 @@
   <p:clrMapOvr>
     <a:masterClrMapping/>
   </p:clrMapOvr>
+  <p:timing>
+    <p:tnLst>
+      <p:par>
+        <p:cTn id="1" dur="indefinite" restart="never" nodeType="tmRoot"/>
+      </p:par>
+    </p:tnLst>
+  </p:timing>
 </p:sld>
 </file>
 
@@ -5642,8 +5649,12 @@
           <a:lstStyle/>
           <a:p>
             <a:r>
-              <a:rPr lang="en-US" altLang="en-US" b="1"/>
-              <a:t>Array indexing</a:t>
+              <a:rPr lang="en-US" altLang="en-US" b="1" dirty="0" smtClean="0"/>
+              <a:t>Multi-dimensional array </a:t>
+            </a:r>
+            <a:r>
+              <a:rPr lang="en-US" altLang="en-US" b="1" dirty="0"/>
+              <a:t>indexing</a:t>
             </a:r>
           </a:p>
         </p:txBody>
@@ -5661,7 +5672,7 @@
         <p:spPr>
           <a:xfrm>
             <a:off x="250825" y="1430338"/>
-            <a:ext cx="8518525" cy="3827462"/>
+            <a:ext cx="8518525" cy="4084195"/>
           </a:xfrm>
         </p:spPr>
         <p:txBody>
@@ -5675,8 +5686,19 @@
               <a:buNone/>
             </a:pPr>
             <a:r>
-              <a:rPr lang="en-US" altLang="en-US" sz="3200"/>
-              <a:t>For multi-dimensional arrays, indexing between different dimensions is separated by commas.</a:t>
+              <a:rPr lang="en-US" altLang="en-US" sz="3200" dirty="0"/>
+              <a:t>For multi-dimensional arrays, indexing between different dimensions is separated by </a:t>
+            </a:r>
+            <a:r>
+              <a:rPr lang="en-US" altLang="en-US" sz="3200" dirty="0" smtClean="0"/>
+              <a:t>commas</a:t>
+            </a:r>
+            <a:br>
+              <a:rPr lang="en-US" altLang="en-US" sz="3200" dirty="0" smtClean="0"/>
+            </a:br>
+            <a:r>
+              <a:rPr lang="en-US" altLang="en-US" sz="3200" dirty="0" smtClean="0"/>
+              <a:t>(fastest-varying dimension is last).</a:t>
             </a:r>
           </a:p>
           <a:p>
@@ -5684,7 +5706,28 @@
               <a:buFont typeface="Arial" panose="020B0604020202020204" pitchFamily="34" charset="0"/>
               <a:buNone/>
             </a:pPr>
-            <a:endParaRPr lang="en-US" altLang="en-US" sz="3200">
+            <a:r>
+              <a:rPr lang="en-US" altLang="en-US" sz="3200" dirty="0" smtClean="0"/>
+              <a:t>e.g.   </a:t>
+            </a:r>
+            <a:r>
+              <a:rPr lang="en-US" altLang="en-US" sz="3200" dirty="0" smtClean="0"/>
+              <a:t>a[4, 2]      </a:t>
+            </a:r>
+            <a:r>
+              <a:rPr lang="en-US" altLang="en-US" sz="3200" dirty="0" smtClean="0">
+                <a:sym typeface="Wingdings" panose="05000000000000000000" pitchFamily="2" charset="2"/>
+              </a:rPr>
+              <a:t> [row, col]</a:t>
+            </a:r>
+            <a:endParaRPr lang="en-US" altLang="en-US" sz="3200" dirty="0" smtClean="0"/>
+          </a:p>
+          <a:p>
+            <a:pPr marL="230188" indent="0">
+              <a:buFont typeface="Arial" panose="020B0604020202020204" pitchFamily="34" charset="0"/>
+              <a:buNone/>
+            </a:pPr>
+            <a:endParaRPr lang="en-US" altLang="en-US" sz="3200" dirty="0">
               <a:cs typeface="Calibri" panose="020F0502020204030204" pitchFamily="34" charset="0"/>
             </a:endParaRPr>
           </a:p>
@@ -5693,26 +5736,47 @@
               <a:spcBef>
                 <a:spcPts val="600"/>
               </a:spcBef>
+              <a:buNone/>
             </a:pPr>
             <a:r>
-              <a:rPr lang="en-US" altLang="en-US" sz="3200"/>
-              <a:t> The fastest varying dimension is the last index. Thus, a 2-D array is indexed [row, col].</a:t>
-            </a:r>
-            <a:endParaRPr lang="en-US" altLang="en-US" sz="3200">
-              <a:cs typeface="Calibri" panose="020F0502020204030204" pitchFamily="34" charset="0"/>
-            </a:endParaRPr>
+              <a:rPr lang="en-US" altLang="en-US" sz="3200" dirty="0" smtClean="0"/>
+              <a:t>Slicing </a:t>
+            </a:r>
+            <a:r>
+              <a:rPr lang="en-US" altLang="en-US" sz="3200" dirty="0"/>
+              <a:t>rules also work as applied for each </a:t>
+            </a:r>
+            <a:r>
+              <a:rPr lang="en-US" altLang="en-US" sz="3200" dirty="0" smtClean="0"/>
+              <a:t>dimension.</a:t>
+            </a:r>
           </a:p>
           <a:p>
             <a:pPr marL="230188" indent="0">
               <a:spcBef>
                 <a:spcPts val="600"/>
               </a:spcBef>
+              <a:buNone/>
             </a:pPr>
             <a:r>
-              <a:rPr lang="en-US" altLang="en-US" sz="3200"/>
-              <a:t> Slicing rules also work as applied for each dimension (e.g., a colon selects all elements in that dimension).</a:t>
-            </a:r>
-            <a:endParaRPr lang="en-US" altLang="en-US" sz="3200">
+              <a:rPr lang="en-US" altLang="en-US" sz="3200" dirty="0" smtClean="0">
+                <a:cs typeface="Calibri" panose="020F0502020204030204" pitchFamily="34" charset="0"/>
+              </a:rPr>
+              <a:t>e.g. </a:t>
+            </a:r>
+            <a:r>
+              <a:rPr lang="en-US" altLang="en-US" sz="3200" dirty="0">
+                <a:cs typeface="Calibri" panose="020F0502020204030204" pitchFamily="34" charset="0"/>
+              </a:rPr>
+              <a:t> </a:t>
+            </a:r>
+            <a:r>
+              <a:rPr lang="en-US" altLang="en-US" sz="3200" dirty="0" smtClean="0">
+                <a:cs typeface="Calibri" panose="020F0502020204030204" pitchFamily="34" charset="0"/>
+              </a:rPr>
+              <a:t> a[1, :, 4:7]</a:t>
+            </a:r>
+            <a:endParaRPr lang="en-US" altLang="en-US" sz="3200" dirty="0">
               <a:cs typeface="Calibri" panose="020F0502020204030204" pitchFamily="34" charset="0"/>
             </a:endParaRPr>
           </a:p>
@@ -5726,6 +5790,13 @@
   <p:transition>
     <p:cut/>
   </p:transition>
+  <p:timing>
+    <p:tnLst>
+      <p:par>
+        <p:cTn id="1" dur="indefinite" restart="never" nodeType="tmRoot"/>
+      </p:par>
+    </p:tnLst>
+  </p:timing>
 </p:sld>
 </file>
 
@@ -5767,7 +5838,7 @@
           <a:lstStyle/>
           <a:p>
             <a:r>
-              <a:rPr lang="en-US" altLang="en-US" b="1"/>
+              <a:rPr lang="en-US" altLang="en-US" b="1" dirty="0"/>
               <a:t>Multi-dimensional array indexing</a:t>
             </a:r>
           </a:p>
@@ -5987,44 +6058,44 @@
               <a:buNone/>
             </a:pPr>
             <a:r>
-              <a:rPr lang="en-US" altLang="en-US" sz="3200">
+              <a:rPr lang="en-US" altLang="en-US" sz="3200" dirty="0">
                 <a:cs typeface="Calibri" panose="020F0502020204030204" pitchFamily="34" charset="0"/>
               </a:rPr>
               <a:t>What is </a:t>
             </a:r>
             <a:r>
-              <a:rPr lang="en-US" altLang="en-US" sz="3200">
+              <a:rPr lang="en-US" altLang="en-US" sz="3200" dirty="0">
                 <a:ea typeface="MS Gothic" panose="020B0609070205080204" pitchFamily="49" charset="-128"/>
                 <a:cs typeface="Calibri" panose="020F0502020204030204" pitchFamily="34" charset="0"/>
               </a:rPr>
               <a:t>a[1,2] </a:t>
             </a:r>
             <a:r>
-              <a:rPr lang="en-US" altLang="en-US" sz="3200">
+              <a:rPr lang="en-US" altLang="en-US" sz="3200" dirty="0">
                 <a:cs typeface="Calibri" panose="020F0502020204030204" pitchFamily="34" charset="0"/>
               </a:rPr>
               <a:t>equal to? </a:t>
             </a:r>
             <a:r>
-              <a:rPr lang="en-US" altLang="en-US" sz="3200">
+              <a:rPr lang="en-US" altLang="en-US" sz="3200" dirty="0">
                 <a:ea typeface="MS Gothic" panose="020B0609070205080204" pitchFamily="49" charset="-128"/>
               </a:rPr>
               <a:t>a[1,:]</a:t>
             </a:r>
             <a:r>
-              <a:rPr lang="en-US" altLang="en-US" sz="3200">
+              <a:rPr lang="en-US" altLang="en-US" sz="3200" dirty="0">
                 <a:cs typeface="Calibri" panose="020F0502020204030204" pitchFamily="34" charset="0"/>
               </a:rPr>
               <a:t>? </a:t>
             </a:r>
             <a:r>
-              <a:rPr lang="en-US" altLang="en-US" sz="3200">
+              <a:rPr lang="en-US" altLang="en-US" sz="3200" dirty="0">
                 <a:ea typeface="MS Gothic" panose="020B0609070205080204" pitchFamily="49" charset="-128"/>
               </a:rPr>
               <a:t>a[1,1:4]</a:t>
             </a:r>
             <a:r>
-              <a:rPr lang="en-US" altLang="en-US" sz="3200">
+              <a:rPr lang="en-US" altLang="en-US" sz="3200" dirty="0">
                 <a:cs typeface="Calibri" panose="020F0502020204030204" pitchFamily="34" charset="0"/>
               </a:rPr>
               <a:t>? </a:t>
@@ -6096,30 +6167,23 @@
                 <a:latin typeface="Courier New" panose="02070309020205020404" pitchFamily="49" charset="0"/>
                 <a:cs typeface="Courier New" panose="02070309020205020404" pitchFamily="49" charset="0"/>
               </a:rPr>
-              <a:t>([[2, 3.2, 5.5, -6.4, -2.2, </a:t>
-            </a:r>
-            <a:r>
-              <a:rPr lang="en-GB" sz="2400">
-                <a:latin typeface="Courier New" panose="02070309020205020404" pitchFamily="49" charset="0"/>
-                <a:cs typeface="Courier New" panose="02070309020205020404" pitchFamily="49" charset="0"/>
-              </a:rPr>
-              <a:t>2.4</a:t>
-            </a:r>
-            <a:r>
-              <a:rPr lang="en-GB" sz="2400" smtClean="0">
+              <a:t>([[2, 3.2, 5.5, -6.4, -2.2, 2.4</a:t>
+            </a:r>
+            <a:r>
+              <a:rPr lang="en-GB" sz="2400" dirty="0" smtClean="0">
                 <a:latin typeface="Courier New" panose="02070309020205020404" pitchFamily="49" charset="0"/>
                 <a:cs typeface="Courier New" panose="02070309020205020404" pitchFamily="49" charset="0"/>
               </a:rPr>
               <a:t>],</a:t>
             </a:r>
             <a:br>
-              <a:rPr lang="en-GB" sz="2400" smtClean="0">
+              <a:rPr lang="en-GB" sz="2400" dirty="0" smtClean="0">
                 <a:latin typeface="Courier New" panose="02070309020205020404" pitchFamily="49" charset="0"/>
                 <a:cs typeface="Courier New" panose="02070309020205020404" pitchFamily="49" charset="0"/>
               </a:rPr>
             </a:br>
             <a:r>
-              <a:rPr lang="en-GB" sz="2400" smtClean="0">
+              <a:rPr lang="en-GB" sz="2400" dirty="0" smtClean="0">
                 <a:latin typeface="Courier New" panose="02070309020205020404" pitchFamily="49" charset="0"/>
                 <a:cs typeface="Courier New" panose="02070309020205020404" pitchFamily="49" charset="0"/>
               </a:rPr>
@@ -6130,30 +6194,23 @@
                 <a:latin typeface="Courier New" panose="02070309020205020404" pitchFamily="49" charset="0"/>
                 <a:cs typeface="Courier New" panose="02070309020205020404" pitchFamily="49" charset="0"/>
               </a:rPr>
-              <a:t>1, 22, 4, 0.1, 5.3, -</a:t>
-            </a:r>
-            <a:r>
-              <a:rPr lang="en-GB" sz="2400">
-                <a:latin typeface="Courier New" panose="02070309020205020404" pitchFamily="49" charset="0"/>
-                <a:cs typeface="Courier New" panose="02070309020205020404" pitchFamily="49" charset="0"/>
-              </a:rPr>
-              <a:t>9</a:t>
-            </a:r>
-            <a:r>
-              <a:rPr lang="en-GB" sz="2400" smtClean="0">
+              <a:t>1, 22, 4, 0.1, 5.3, -9</a:t>
+            </a:r>
+            <a:r>
+              <a:rPr lang="en-GB" sz="2400" dirty="0" smtClean="0">
                 <a:latin typeface="Courier New" panose="02070309020205020404" pitchFamily="49" charset="0"/>
                 <a:cs typeface="Courier New" panose="02070309020205020404" pitchFamily="49" charset="0"/>
               </a:rPr>
               <a:t>],</a:t>
             </a:r>
             <a:br>
-              <a:rPr lang="en-GB" sz="2400" smtClean="0">
+              <a:rPr lang="en-GB" sz="2400" dirty="0" smtClean="0">
                 <a:latin typeface="Courier New" panose="02070309020205020404" pitchFamily="49" charset="0"/>
                 <a:cs typeface="Courier New" panose="02070309020205020404" pitchFamily="49" charset="0"/>
               </a:rPr>
             </a:br>
             <a:r>
-              <a:rPr lang="en-GB" sz="2400" smtClean="0">
+              <a:rPr lang="en-GB" sz="2400" dirty="0" smtClean="0">
                 <a:latin typeface="Courier New" panose="02070309020205020404" pitchFamily="49" charset="0"/>
                 <a:cs typeface="Courier New" panose="02070309020205020404" pitchFamily="49" charset="0"/>
               </a:rPr>
@@ -7583,7 +7640,7 @@
               <a:buNone/>
             </a:pPr>
             <a:r>
-              <a:rPr lang="en-US" altLang="en-US" sz="2800">
+              <a:rPr lang="en-US" altLang="en-US" sz="2800" dirty="0">
                 <a:cs typeface="Calibri" panose="020F0502020204030204" pitchFamily="34" charset="0"/>
               </a:rPr>
               <a:t>There are many functions to manipulate arrays, e.g.:</a:t>
@@ -7600,7 +7657,7 @@
               <a:buFontTx/>
               <a:buNone/>
             </a:pPr>
-            <a:endParaRPr lang="en-US" altLang="en-US" sz="2800">
+            <a:endParaRPr lang="en-US" altLang="en-US" sz="2800" dirty="0">
               <a:cs typeface="Calibri" panose="020F0502020204030204" pitchFamily="34" charset="0"/>
             </a:endParaRPr>
           </a:p>
@@ -7616,17 +7673,24 @@
               <a:buNone/>
             </a:pPr>
             <a:r>
-              <a:rPr lang="en-US" altLang="en-US" sz="2800">
+              <a:rPr lang="en-US" altLang="en-US" sz="2800" dirty="0">
                 <a:cs typeface="Calibri" panose="020F0502020204030204" pitchFamily="34" charset="0"/>
               </a:rPr>
               <a:t>Reshape the array: e.g.,      	</a:t>
             </a:r>
             <a:r>
-              <a:rPr lang="en-US" altLang="en-US">
-                <a:latin typeface="Courier New" panose="02070309020205020404" pitchFamily="49" charset="0"/>
-                <a:cs typeface="Courier New" panose="02070309020205020404" pitchFamily="49" charset="0"/>
-              </a:rPr>
-              <a:t>np.reshape(a, (2,3))</a:t>
+              <a:rPr lang="en-US" altLang="en-US" dirty="0" err="1">
+                <a:latin typeface="Courier New" panose="02070309020205020404" pitchFamily="49" charset="0"/>
+                <a:cs typeface="Courier New" panose="02070309020205020404" pitchFamily="49" charset="0"/>
+              </a:rPr>
+              <a:t>np.reshape</a:t>
+            </a:r>
+            <a:r>
+              <a:rPr lang="en-US" altLang="en-US" dirty="0">
+                <a:latin typeface="Courier New" panose="02070309020205020404" pitchFamily="49" charset="0"/>
+                <a:cs typeface="Courier New" panose="02070309020205020404" pitchFamily="49" charset="0"/>
+              </a:rPr>
+              <a:t>(a, (2,3))</a:t>
             </a:r>
           </a:p>
           <a:p>
@@ -7641,17 +7705,24 @@
               <a:buNone/>
             </a:pPr>
             <a:r>
-              <a:rPr lang="en-US" altLang="en-US" sz="2800">
+              <a:rPr lang="en-US" altLang="en-US" sz="2800" dirty="0">
                 <a:cs typeface="Calibri" panose="020F0502020204030204" pitchFamily="34" charset="0"/>
               </a:rPr>
               <a:t>Transpose the array:           	</a:t>
             </a:r>
             <a:r>
-              <a:rPr lang="en-US" altLang="en-US">
-                <a:latin typeface="Courier New" panose="02070309020205020404" pitchFamily="49" charset="0"/>
-                <a:cs typeface="Courier New" panose="02070309020205020404" pitchFamily="49" charset="0"/>
-              </a:rPr>
-              <a:t>np.transpose(a)</a:t>
+              <a:rPr lang="en-US" altLang="en-US" dirty="0" err="1">
+                <a:latin typeface="Courier New" panose="02070309020205020404" pitchFamily="49" charset="0"/>
+                <a:cs typeface="Courier New" panose="02070309020205020404" pitchFamily="49" charset="0"/>
+              </a:rPr>
+              <a:t>np.transpose</a:t>
+            </a:r>
+            <a:r>
+              <a:rPr lang="en-US" altLang="en-US" dirty="0">
+                <a:latin typeface="Courier New" panose="02070309020205020404" pitchFamily="49" charset="0"/>
+                <a:cs typeface="Courier New" panose="02070309020205020404" pitchFamily="49" charset="0"/>
+              </a:rPr>
+              <a:t>(a)</a:t>
             </a:r>
           </a:p>
           <a:p>
@@ -7666,17 +7737,24 @@
               <a:buNone/>
             </a:pPr>
             <a:r>
-              <a:rPr lang="en-US" altLang="en-US" sz="2800">
+              <a:rPr lang="en-US" altLang="en-US" sz="2800" dirty="0">
                 <a:cs typeface="Calibri" panose="020F0502020204030204" pitchFamily="34" charset="0"/>
               </a:rPr>
               <a:t>Flatten to a 1-D array:   		</a:t>
             </a:r>
             <a:r>
-              <a:rPr lang="en-US" altLang="en-US">
-                <a:latin typeface="Courier New" panose="02070309020205020404" pitchFamily="49" charset="0"/>
-                <a:cs typeface="Courier New" panose="02070309020205020404" pitchFamily="49" charset="0"/>
-              </a:rPr>
-              <a:t>np.ravel(a)</a:t>
+              <a:rPr lang="en-US" altLang="en-US" dirty="0" err="1">
+                <a:latin typeface="Courier New" panose="02070309020205020404" pitchFamily="49" charset="0"/>
+                <a:cs typeface="Courier New" panose="02070309020205020404" pitchFamily="49" charset="0"/>
+              </a:rPr>
+              <a:t>np.ravel</a:t>
+            </a:r>
+            <a:r>
+              <a:rPr lang="en-US" altLang="en-US" dirty="0">
+                <a:latin typeface="Courier New" panose="02070309020205020404" pitchFamily="49" charset="0"/>
+                <a:cs typeface="Courier New" panose="02070309020205020404" pitchFamily="49" charset="0"/>
+              </a:rPr>
+              <a:t>(a)</a:t>
             </a:r>
           </a:p>
           <a:p>
@@ -7691,17 +7769,38 @@
               <a:buNone/>
             </a:pPr>
             <a:r>
-              <a:rPr lang="en-US" altLang="en-US" sz="2800">
+              <a:rPr lang="en-US" altLang="en-US" sz="2800" dirty="0">
                 <a:cs typeface="Calibri" panose="020F0502020204030204" pitchFamily="34" charset="0"/>
               </a:rPr>
               <a:t>Concatenate arrays:  		</a:t>
             </a:r>
             <a:r>
-              <a:rPr lang="en-US" altLang="en-US">
-                <a:latin typeface="Courier New" panose="02070309020205020404" pitchFamily="49" charset="0"/>
-                <a:cs typeface="Courier New" panose="02070309020205020404" pitchFamily="49" charset="0"/>
-              </a:rPr>
-              <a:t>np.concatenate((a,b))</a:t>
+              <a:rPr lang="en-US" altLang="en-US" dirty="0" err="1">
+                <a:latin typeface="Courier New" panose="02070309020205020404" pitchFamily="49" charset="0"/>
+                <a:cs typeface="Courier New" panose="02070309020205020404" pitchFamily="49" charset="0"/>
+              </a:rPr>
+              <a:t>np.concatenate</a:t>
+            </a:r>
+            <a:r>
+              <a:rPr lang="en-US" altLang="en-US" dirty="0">
+                <a:latin typeface="Courier New" panose="02070309020205020404" pitchFamily="49" charset="0"/>
+                <a:cs typeface="Courier New" panose="02070309020205020404" pitchFamily="49" charset="0"/>
+              </a:rPr>
+              <a:t>((</a:t>
+            </a:r>
+            <a:r>
+              <a:rPr lang="en-US" altLang="en-US" dirty="0" err="1">
+                <a:latin typeface="Courier New" panose="02070309020205020404" pitchFamily="49" charset="0"/>
+                <a:cs typeface="Courier New" panose="02070309020205020404" pitchFamily="49" charset="0"/>
+              </a:rPr>
+              <a:t>a,b</a:t>
+            </a:r>
+            <a:r>
+              <a:rPr lang="en-US" altLang="en-US" dirty="0">
+                <a:latin typeface="Courier New" panose="02070309020205020404" pitchFamily="49" charset="0"/>
+                <a:cs typeface="Courier New" panose="02070309020205020404" pitchFamily="49" charset="0"/>
+              </a:rPr>
+              <a:t>))</a:t>
             </a:r>
           </a:p>
           <a:p>
@@ -7716,24 +7815,31 @@
               <a:buNone/>
             </a:pPr>
             <a:r>
-              <a:rPr lang="en-US" altLang="en-US" sz="2800">
+              <a:rPr lang="en-US" altLang="en-US" sz="2800" dirty="0">
                 <a:cs typeface="Calibri" panose="020F0502020204030204" pitchFamily="34" charset="0"/>
               </a:rPr>
               <a:t>Repeat array elements: e.g., </a:t>
             </a:r>
             <a:r>
-              <a:rPr lang="en-US" altLang="en-US" sz="2800">
+              <a:rPr lang="en-US" altLang="en-US" sz="2800" dirty="0">
                 <a:latin typeface="Courier New" panose="02070309020205020404" pitchFamily="49" charset="0"/>
                 <a:cs typeface="Courier New" panose="02070309020205020404" pitchFamily="49" charset="0"/>
               </a:rPr>
               <a:t>  	</a:t>
             </a:r>
             <a:r>
-              <a:rPr lang="en-GB" altLang="en-US">
-                <a:latin typeface="Courier New" panose="02070309020205020404" pitchFamily="49" charset="0"/>
-                <a:cs typeface="Courier New" panose="02070309020205020404" pitchFamily="49" charset="0"/>
-              </a:rPr>
-              <a:t>np.repeat(a, 3)</a:t>
+              <a:rPr lang="en-GB" altLang="en-US" dirty="0" err="1">
+                <a:latin typeface="Courier New" panose="02070309020205020404" pitchFamily="49" charset="0"/>
+                <a:cs typeface="Courier New" panose="02070309020205020404" pitchFamily="49" charset="0"/>
+              </a:rPr>
+              <a:t>np.repeat</a:t>
+            </a:r>
+            <a:r>
+              <a:rPr lang="en-GB" altLang="en-US" dirty="0">
+                <a:latin typeface="Courier New" panose="02070309020205020404" pitchFamily="49" charset="0"/>
+                <a:cs typeface="Courier New" panose="02070309020205020404" pitchFamily="49" charset="0"/>
+              </a:rPr>
+              <a:t>(a, 3)</a:t>
             </a:r>
           </a:p>
         </p:txBody>
@@ -7746,6 +7852,13 @@
   <p:transition>
     <p:cut/>
   </p:transition>
+  <p:timing>
+    <p:tnLst>
+      <p:par>
+        <p:cTn id="1" dur="indefinite" restart="never" nodeType="tmRoot"/>
+      </p:par>
+    </p:tnLst>
+  </p:timing>
 </p:sld>
 </file>
 
@@ -8502,6 +8615,13 @@
   <p:transition>
     <p:cut/>
   </p:transition>
+  <p:timing>
+    <p:tnLst>
+      <p:par>
+        <p:cTn id="1" dur="indefinite" restart="never" nodeType="tmRoot"/>
+      </p:par>
+    </p:tnLst>
+  </p:timing>
 </p:sld>
 </file>
 
@@ -9758,6 +9878,13 @@
   <p:clrMapOvr>
     <a:masterClrMapping/>
   </p:clrMapOvr>
+  <p:timing>
+    <p:tnLst>
+      <p:par>
+        <p:cTn id="1" dur="indefinite" restart="never" nodeType="tmRoot"/>
+      </p:par>
+    </p:tnLst>
+  </p:timing>
 </p:sld>
 </file>
 
@@ -9818,7 +9945,7 @@
         <p:spPr>
           <a:xfrm>
             <a:off x="755576" y="2204864"/>
-            <a:ext cx="7488238" cy="1538883"/>
+            <a:ext cx="7488238" cy="2154436"/>
           </a:xfrm>
           <a:prstGeom prst="rect">
             <a:avLst/>
@@ -9873,34 +10000,24 @@
                 <a:latin typeface="Courier New" panose="02070309020205020404" pitchFamily="49" charset="0"/>
                 <a:cs typeface="Courier New" panose="02070309020205020404" pitchFamily="49" charset="0"/>
               </a:rPr>
-              <a:t> np</a:t>
+              <a:t> </a:t>
+            </a:r>
+            <a:r>
+              <a:rPr lang="en-GB" sz="2000" spc="-119" dirty="0" smtClean="0">
+                <a:latin typeface="Courier New" panose="02070309020205020404" pitchFamily="49" charset="0"/>
+                <a:cs typeface="Courier New" panose="02070309020205020404" pitchFamily="49" charset="0"/>
+              </a:rPr>
+              <a:t>np</a:t>
             </a:r>
           </a:p>
           <a:p>
             <a:pPr marL="25179" eaLnBrk="1" hangingPunct="1">
               <a:defRPr/>
             </a:pPr>
-            <a:r>
-              <a:rPr lang="en-GB" sz="2000" dirty="0">
-                <a:latin typeface="Courier New" panose="02070309020205020404" pitchFamily="49" charset="0"/>
-                <a:cs typeface="Courier New" panose="02070309020205020404" pitchFamily="49" charset="0"/>
-              </a:rPr>
-              <a:t>a = </a:t>
-            </a:r>
-            <a:r>
-              <a:rPr lang="en-GB" sz="2000" dirty="0" err="1">
-                <a:latin typeface="Courier New" panose="02070309020205020404" pitchFamily="49" charset="0"/>
-                <a:cs typeface="Courier New" panose="02070309020205020404" pitchFamily="49" charset="0"/>
-              </a:rPr>
-              <a:t>np.array</a:t>
-            </a:r>
-            <a:r>
-              <a:rPr lang="en-GB" sz="2000" dirty="0">
-                <a:latin typeface="Courier New" panose="02070309020205020404" pitchFamily="49" charset="0"/>
-                <a:cs typeface="Courier New" panose="02070309020205020404" pitchFamily="49" charset="0"/>
-              </a:rPr>
-              <a:t>([[2, 3.2, 5.5, -6.4],</a:t>
-            </a:r>
+            <a:endParaRPr lang="en-GB" sz="2000" spc="-119" dirty="0">
+              <a:latin typeface="Courier New" panose="02070309020205020404" pitchFamily="49" charset="0"/>
+              <a:cs typeface="Courier New" panose="02070309020205020404" pitchFamily="49" charset="0"/>
+            </a:endParaRPr>
           </a:p>
           <a:p>
             <a:pPr marL="25179" eaLnBrk="1" hangingPunct="1">
@@ -9911,8 +10028,50 @@
                 <a:latin typeface="Courier New" panose="02070309020205020404" pitchFamily="49" charset="0"/>
                 <a:cs typeface="Courier New" panose="02070309020205020404" pitchFamily="49" charset="0"/>
               </a:rPr>
-              <a:t>              [3, 1, 2.1, 21]])</a:t>
-            </a:r>
+              <a:t>a = </a:t>
+            </a:r>
+            <a:r>
+              <a:rPr lang="en-GB" sz="2000" dirty="0" err="1">
+                <a:latin typeface="Courier New" panose="02070309020205020404" pitchFamily="49" charset="0"/>
+                <a:cs typeface="Courier New" panose="02070309020205020404" pitchFamily="49" charset="0"/>
+              </a:rPr>
+              <a:t>np.array</a:t>
+            </a:r>
+            <a:r>
+              <a:rPr lang="en-GB" sz="2000" dirty="0">
+                <a:latin typeface="Courier New" panose="02070309020205020404" pitchFamily="49" charset="0"/>
+                <a:cs typeface="Courier New" panose="02070309020205020404" pitchFamily="49" charset="0"/>
+              </a:rPr>
+              <a:t>([[2, 3.2, 5.5, -6.4],</a:t>
+            </a:r>
+          </a:p>
+          <a:p>
+            <a:pPr marL="25179" eaLnBrk="1" hangingPunct="1">
+              <a:defRPr/>
+            </a:pPr>
+            <a:r>
+              <a:rPr lang="en-GB" sz="2000" dirty="0">
+                <a:latin typeface="Courier New" panose="02070309020205020404" pitchFamily="49" charset="0"/>
+                <a:cs typeface="Courier New" panose="02070309020205020404" pitchFamily="49" charset="0"/>
+              </a:rPr>
+              <a:t>              [3, 1, 2.1, 21</a:t>
+            </a:r>
+            <a:r>
+              <a:rPr lang="en-GB" sz="2000" dirty="0" smtClean="0">
+                <a:latin typeface="Courier New" panose="02070309020205020404" pitchFamily="49" charset="0"/>
+                <a:cs typeface="Courier New" panose="02070309020205020404" pitchFamily="49" charset="0"/>
+              </a:rPr>
+              <a:t>]])</a:t>
+            </a:r>
+          </a:p>
+          <a:p>
+            <a:pPr marL="25179" eaLnBrk="1" hangingPunct="1">
+              <a:defRPr/>
+            </a:pPr>
+            <a:endParaRPr lang="en-GB" sz="2000" dirty="0">
+              <a:latin typeface="Courier New" panose="02070309020205020404" pitchFamily="49" charset="0"/>
+              <a:cs typeface="Courier New" panose="02070309020205020404" pitchFamily="49" charset="0"/>
+            </a:endParaRPr>
           </a:p>
           <a:p>
             <a:pPr marL="25179" eaLnBrk="1" hangingPunct="1">
@@ -10101,6 +10260,13 @@
   <p:transition>
     <p:cut/>
   </p:transition>
+  <p:timing>
+    <p:tnLst>
+      <p:par>
+        <p:cTn id="1" dur="indefinite" restart="never" nodeType="tmRoot"/>
+      </p:par>
+    </p:tnLst>
+  </p:timing>
 </p:sld>
 </file>
 
@@ -11469,6 +11635,13 @@
   <p:clrMapOvr>
     <a:masterClrMapping/>
   </p:clrMapOvr>
+  <p:timing>
+    <p:tnLst>
+      <p:par>
+        <p:cTn id="1" dur="indefinite" restart="never" nodeType="tmRoot"/>
+      </p:par>
+    </p:tnLst>
+  </p:timing>
 </p:sld>
 </file>
 
@@ -11756,6 +11929,13 @@
   <p:transition>
     <p:cut/>
   </p:transition>
+  <p:timing>
+    <p:tnLst>
+      <p:par>
+        <p:cTn id="1" dur="indefinite" restart="never" nodeType="tmRoot"/>
+      </p:par>
+    </p:tnLst>
+  </p:timing>
 </p:sld>
 </file>
 
@@ -12017,7 +12197,7 @@
               <a:buNone/>
             </a:pPr>
             <a:r>
-              <a:rPr lang="en-US" altLang="en-US" sz="2800">
+              <a:rPr lang="en-US" altLang="en-US" sz="2800" dirty="0">
                 <a:cs typeface="Calibri" panose="020F0502020204030204" pitchFamily="34" charset="0"/>
               </a:rPr>
               <a:t>Comparison operators (implemented either as operators or functions) act element-wise, and return a Boolean array. For instance:</a:t>
@@ -12344,6 +12524,13 @@
   <p:transition>
     <p:cut/>
   </p:transition>
+  <p:timing>
+    <p:tnLst>
+      <p:par>
+        <p:cTn id="1" dur="indefinite" restart="never" nodeType="tmRoot"/>
+      </p:par>
+    </p:tnLst>
+  </p:timing>
 </p:sld>
 </file>
 
@@ -12630,18 +12817,30 @@
               <a:rPr lang="en-US" altLang="en-US" sz="2800" dirty="0">
                 <a:cs typeface="Calibri" panose="020F0502020204030204" pitchFamily="34" charset="0"/>
               </a:rPr>
-              <a:t>function tests any condition and applies operations for true and false cases,</a:t>
+              <a:t>function tests any condition and applies operations for true and false </a:t>
+            </a:r>
+            <a:r>
+              <a:rPr lang="en-US" altLang="en-US" sz="2800" dirty="0" smtClean="0">
+                <a:cs typeface="Calibri" panose="020F0502020204030204" pitchFamily="34" charset="0"/>
+              </a:rPr>
+              <a:t>cases, as specified,</a:t>
             </a:r>
             <a:br>
+              <a:rPr lang="en-US" altLang="en-US" sz="2800" dirty="0" smtClean="0">
+                <a:cs typeface="Calibri" panose="020F0502020204030204" pitchFamily="34" charset="0"/>
+              </a:rPr>
+            </a:br>
+            <a:r>
+              <a:rPr lang="en-US" altLang="en-US" sz="2800" dirty="0" smtClean="0">
+                <a:cs typeface="Calibri" panose="020F0502020204030204" pitchFamily="34" charset="0"/>
+              </a:rPr>
+              <a:t>on </a:t>
+            </a:r>
+            <a:r>
               <a:rPr lang="en-US" altLang="en-US" sz="2800" dirty="0">
                 <a:cs typeface="Calibri" panose="020F0502020204030204" pitchFamily="34" charset="0"/>
               </a:rPr>
-            </a:br>
-            <a:r>
-              <a:rPr lang="en-US" altLang="en-US" sz="2800" dirty="0">
-                <a:cs typeface="Calibri" panose="020F0502020204030204" pitchFamily="34" charset="0"/>
-              </a:rPr>
-              <a:t>as specified, on an element-wise basis.</a:t>
+              <a:t>an element-wise basis.</a:t>
             </a:r>
           </a:p>
           <a:p>
@@ -12991,6 +13190,13 @@
   <p:transition>
     <p:cut/>
   </p:transition>
+  <p:timing>
+    <p:tnLst>
+      <p:par>
+        <p:cTn id="1" dur="indefinite" restart="never" nodeType="tmRoot"/>
+      </p:par>
+    </p:tnLst>
+  </p:timing>
 </p:sld>
 </file>
 
@@ -13358,6 +13564,13 @@
   <p:transition>
     <p:cut/>
   </p:transition>
+  <p:timing>
+    <p:tnLst>
+      <p:par>
+        <p:cTn id="1" dur="indefinite" restart="never" nodeType="tmRoot"/>
+      </p:par>
+    </p:tnLst>
+  </p:timing>
 </p:sld>
 </file>
 
@@ -13762,6 +13975,13 @@
   <p:transition>
     <p:cut/>
   </p:transition>
+  <p:timing>
+    <p:tnLst>
+      <p:par>
+        <p:cTn id="1" dur="indefinite" restart="never" nodeType="tmRoot"/>
+      </p:par>
+    </p:tnLst>
+  </p:timing>
 </p:sld>
 </file>
 
@@ -13825,6 +14045,13 @@
   <p:transition>
     <p:cut/>
   </p:transition>
+  <p:timing>
+    <p:tnLst>
+      <p:par>
+        <p:cTn id="1" dur="indefinite" restart="never" nodeType="tmRoot"/>
+      </p:par>
+    </p:tnLst>
+  </p:timing>
 </p:sld>
 </file>
 
@@ -14210,6 +14437,13 @@
   <p:transition>
     <p:cut/>
   </p:transition>
+  <p:timing>
+    <p:tnLst>
+      <p:par>
+        <p:cTn id="1" dur="indefinite" restart="never" nodeType="tmRoot"/>
+      </p:par>
+    </p:tnLst>
+  </p:timing>
 </p:sld>
 </file>
 
@@ -14301,6 +14535,13 @@
   <p:transition>
     <p:cut/>
   </p:transition>
+  <p:timing>
+    <p:tnLst>
+      <p:par>
+        <p:cTn id="1" dur="indefinite" restart="never" nodeType="tmRoot"/>
+      </p:par>
+    </p:tnLst>
+  </p:timing>
 </p:sld>
 </file>
 
@@ -14535,13 +14776,13 @@
               <a:buNone/>
             </a:pPr>
             <a:r>
-              <a:rPr lang="en-US" altLang="en-US" sz="2800">
+              <a:rPr lang="en-US" altLang="en-US" sz="2800" dirty="0">
                 <a:cs typeface="Calibri" panose="020F0502020204030204" pitchFamily="34" charset="0"/>
               </a:rPr>
               <a:t>All functions are part of the </a:t>
             </a:r>
             <a:r>
-              <a:rPr lang="en-US" altLang="en-US" sz="2800">
+              <a:rPr lang="en-US" altLang="en-US" sz="2800" dirty="0">
                 <a:latin typeface="Courier New" panose="02070309020205020404" pitchFamily="49" charset="0"/>
                 <a:ea typeface="MS Gothic" panose="020B0609070205080204" pitchFamily="49" charset="-128"/>
                 <a:cs typeface="Courier New" panose="02070309020205020404" pitchFamily="49" charset="0"/>
@@ -14549,7 +14790,7 @@
               <a:t>numpy.ma</a:t>
             </a:r>
             <a:r>
-              <a:rPr lang="en-US" altLang="en-US" sz="2800">
+              <a:rPr lang="en-US" altLang="en-US" sz="2800" dirty="0">
                 <a:latin typeface="MS Gothic" panose="020B0609070205080204" pitchFamily="49" charset="-128"/>
                 <a:ea typeface="MS Gothic" panose="020B0609070205080204" pitchFamily="49" charset="-128"/>
                 <a:cs typeface="Calibri" panose="020F0502020204030204" pitchFamily="34" charset="0"/>
@@ -14557,43 +14798,44 @@
               <a:t> </a:t>
             </a:r>
             <a:r>
-              <a:rPr lang="en-US" altLang="en-US" sz="2800">
+              <a:rPr lang="en-US" altLang="en-US" sz="2800" dirty="0">
                 <a:cs typeface="Calibri" panose="020F0502020204030204" pitchFamily="34" charset="0"/>
               </a:rPr>
               <a:t>submodule. </a:t>
             </a:r>
             <a:br>
-              <a:rPr lang="en-US" altLang="en-US" sz="2800">
+              <a:rPr lang="en-US" altLang="en-US" sz="2800" dirty="0">
                 <a:cs typeface="Calibri" panose="020F0502020204030204" pitchFamily="34" charset="0"/>
               </a:rPr>
             </a:br>
             <a:r>
-              <a:rPr lang="en-US" altLang="en-US" sz="2800">
+              <a:rPr lang="en-US" altLang="en-US" sz="2800" dirty="0">
                 <a:cs typeface="Calibri" panose="020F0502020204030204" pitchFamily="34" charset="0"/>
               </a:rPr>
               <a:t/>
             </a:r>
             <a:br>
-              <a:rPr lang="en-US" altLang="en-US" sz="2800">
+              <a:rPr lang="en-US" altLang="en-US" sz="2800" dirty="0">
                 <a:cs typeface="Calibri" panose="020F0502020204030204" pitchFamily="34" charset="0"/>
               </a:rPr>
             </a:br>
             <a:r>
-              <a:rPr lang="en-US" altLang="en-US" sz="2800">
-                <a:cs typeface="Calibri" panose="020F0502020204030204" pitchFamily="34" charset="0"/>
-              </a:rPr>
-              <a:t>In these examples, assume that</a:t>
-            </a:r>
-            <a:br>
-              <a:rPr lang="en-US" altLang="en-US" sz="2800">
-                <a:cs typeface="Calibri" panose="020F0502020204030204" pitchFamily="34" charset="0"/>
-              </a:rPr>
-            </a:br>
-            <a:r>
-              <a:rPr lang="en-US" altLang="en-US" sz="2800">
-                <a:cs typeface="Calibri" panose="020F0502020204030204" pitchFamily="34" charset="0"/>
-              </a:rPr>
-              <a:t>I import that submodule with:</a:t>
+              <a:rPr lang="en-US" altLang="en-US" sz="2800" dirty="0">
+                <a:cs typeface="Calibri" panose="020F0502020204030204" pitchFamily="34" charset="0"/>
+              </a:rPr>
+              <a:t>In these examples, assume </a:t>
+            </a:r>
+            <a:r>
+              <a:rPr lang="en-US" altLang="en-US" sz="2800" dirty="0" smtClean="0">
+                <a:cs typeface="Calibri" panose="020F0502020204030204" pitchFamily="34" charset="0"/>
+              </a:rPr>
+              <a:t>that I </a:t>
+            </a:r>
+            <a:r>
+              <a:rPr lang="en-US" altLang="en-US" sz="2800" dirty="0">
+                <a:cs typeface="Calibri" panose="020F0502020204030204" pitchFamily="34" charset="0"/>
+              </a:rPr>
+              <a:t>import that submodule with:</a:t>
             </a:r>
           </a:p>
           <a:p>
@@ -14608,28 +14850,28 @@
               <a:buNone/>
             </a:pPr>
             <a:r>
-              <a:rPr lang="en-US" altLang="en-US" sz="2800" b="1">
+              <a:rPr lang="en-US" altLang="en-US" sz="2800" b="1" dirty="0">
                 <a:latin typeface="Courier New" panose="02070309020205020404" pitchFamily="49" charset="0"/>
                 <a:ea typeface="MS Gothic" panose="020B0609070205080204" pitchFamily="49" charset="-128"/>
               </a:rPr>
               <a:t>import</a:t>
             </a:r>
             <a:r>
-              <a:rPr lang="en-US" altLang="en-US" sz="2800">
+              <a:rPr lang="en-US" altLang="en-US" sz="2800" dirty="0">
                 <a:latin typeface="Courier New" panose="02070309020205020404" pitchFamily="49" charset="0"/>
                 <a:ea typeface="MS Gothic" panose="020B0609070205080204" pitchFamily="49" charset="-128"/>
               </a:rPr>
               <a:t> numpy.ma </a:t>
             </a:r>
             <a:r>
-              <a:rPr lang="en-US" altLang="en-US" sz="2800" b="1">
+              <a:rPr lang="en-US" altLang="en-US" sz="2800" b="1" dirty="0">
                 <a:latin typeface="Courier New" panose="02070309020205020404" pitchFamily="49" charset="0"/>
                 <a:ea typeface="MS Gothic" panose="020B0609070205080204" pitchFamily="49" charset="-128"/>
               </a:rPr>
               <a:t>as</a:t>
             </a:r>
             <a:r>
-              <a:rPr lang="en-US" altLang="en-US" sz="2800">
+              <a:rPr lang="en-US" altLang="en-US" sz="2800" dirty="0">
                 <a:latin typeface="Courier New" panose="02070309020205020404" pitchFamily="49" charset="0"/>
                 <a:ea typeface="MS Gothic" panose="020B0609070205080204" pitchFamily="49" charset="-128"/>
               </a:rPr>
@@ -14647,7 +14889,7 @@
               <a:buFontTx/>
               <a:buNone/>
             </a:pPr>
-            <a:endParaRPr lang="en-US" altLang="en-US" sz="2800">
+            <a:endParaRPr lang="en-US" altLang="en-US" sz="2800" dirty="0">
               <a:cs typeface="Calibri" panose="020F0502020204030204" pitchFamily="34" charset="0"/>
             </a:endParaRPr>
           </a:p>
@@ -14663,10 +14905,22 @@
               <a:buNone/>
             </a:pPr>
             <a:r>
-              <a:rPr lang="en-US" altLang="en-US" sz="2800">
-                <a:cs typeface="Calibri" panose="020F0502020204030204" pitchFamily="34" charset="0"/>
-              </a:rPr>
-              <a:t>and NumPy is imported as </a:t>
+              <a:rPr lang="en-US" altLang="en-US" sz="2800" dirty="0">
+                <a:cs typeface="Calibri" panose="020F0502020204030204" pitchFamily="34" charset="0"/>
+              </a:rPr>
+              <a:t>and </a:t>
+            </a:r>
+            <a:r>
+              <a:rPr lang="en-US" altLang="en-US" sz="2800" dirty="0" err="1">
+                <a:cs typeface="Calibri" panose="020F0502020204030204" pitchFamily="34" charset="0"/>
+              </a:rPr>
+              <a:t>NumPy</a:t>
+            </a:r>
+            <a:r>
+              <a:rPr lang="en-US" altLang="en-US" sz="2800" dirty="0">
+                <a:cs typeface="Calibri" panose="020F0502020204030204" pitchFamily="34" charset="0"/>
+              </a:rPr>
+              <a:t> is imported as </a:t>
             </a:r>
           </a:p>
           <a:p>
@@ -14681,34 +14935,48 @@
               <a:buNone/>
             </a:pPr>
             <a:r>
-              <a:rPr lang="en-US" altLang="en-US" sz="2800" b="1">
+              <a:rPr lang="en-US" altLang="en-US" sz="2800" b="1" dirty="0">
                 <a:latin typeface="Courier New" panose="02070309020205020404" pitchFamily="49" charset="0"/>
                 <a:ea typeface="MS Gothic" panose="020B0609070205080204" pitchFamily="49" charset="-128"/>
               </a:rPr>
               <a:t>import</a:t>
             </a:r>
             <a:r>
-              <a:rPr lang="en-US" altLang="en-US" sz="2800">
+              <a:rPr lang="en-US" altLang="en-US" sz="2800" dirty="0">
                 <a:latin typeface="Courier New" panose="02070309020205020404" pitchFamily="49" charset="0"/>
                 <a:ea typeface="MS Gothic" panose="020B0609070205080204" pitchFamily="49" charset="-128"/>
               </a:rPr>
-              <a:t> numpy </a:t>
-            </a:r>
-            <a:r>
-              <a:rPr lang="en-US" altLang="en-US" sz="2800" b="1">
+              <a:t> </a:t>
+            </a:r>
+            <a:r>
+              <a:rPr lang="en-US" altLang="en-US" sz="2800" dirty="0" err="1">
                 <a:latin typeface="Courier New" panose="02070309020205020404" pitchFamily="49" charset="0"/>
                 <a:ea typeface="MS Gothic" panose="020B0609070205080204" pitchFamily="49" charset="-128"/>
               </a:rPr>
+              <a:t>numpy</a:t>
+            </a:r>
+            <a:r>
+              <a:rPr lang="en-US" altLang="en-US" sz="2800" dirty="0">
+                <a:latin typeface="Courier New" panose="02070309020205020404" pitchFamily="49" charset="0"/>
+                <a:ea typeface="MS Gothic" panose="020B0609070205080204" pitchFamily="49" charset="-128"/>
+              </a:rPr>
+              <a:t> </a:t>
+            </a:r>
+            <a:r>
+              <a:rPr lang="en-US" altLang="en-US" sz="2800" b="1" dirty="0">
+                <a:latin typeface="Courier New" panose="02070309020205020404" pitchFamily="49" charset="0"/>
+                <a:ea typeface="MS Gothic" panose="020B0609070205080204" pitchFamily="49" charset="-128"/>
+              </a:rPr>
               <a:t>as</a:t>
             </a:r>
             <a:r>
-              <a:rPr lang="en-US" altLang="en-US" sz="2800">
+              <a:rPr lang="en-US" altLang="en-US" sz="2800" dirty="0">
                 <a:latin typeface="Courier New" panose="02070309020205020404" pitchFamily="49" charset="0"/>
                 <a:ea typeface="MS Gothic" panose="020B0609070205080204" pitchFamily="49" charset="-128"/>
               </a:rPr>
               <a:t> np</a:t>
             </a:r>
-            <a:endParaRPr lang="en-US" altLang="en-US" sz="2800">
+            <a:endParaRPr lang="en-US" altLang="en-US" sz="2800" dirty="0">
               <a:cs typeface="Calibri" panose="020F0502020204030204" pitchFamily="34" charset="0"/>
             </a:endParaRPr>
           </a:p>
@@ -14942,6 +15210,13 @@
   <p:transition>
     <p:cut/>
   </p:transition>
+  <p:timing>
+    <p:tnLst>
+      <p:par>
+        <p:cTn id="1" dur="indefinite" restart="never" nodeType="tmRoot"/>
+      </p:par>
+    </p:tnLst>
+  </p:timing>
 </p:sld>
 </file>
 
@@ -15995,6 +16270,13 @@
   <p:transition>
     <p:cut/>
   </p:transition>
+  <p:timing>
+    <p:tnLst>
+      <p:par>
+        <p:cTn id="1" dur="indefinite" restart="never" nodeType="tmRoot"/>
+      </p:par>
+    </p:tnLst>
+  </p:timing>
 </p:sld>
 </file>
 
@@ -17366,6 +17648,13 @@
   <p:transition>
     <p:cut/>
   </p:transition>
+  <p:timing>
+    <p:tnLst>
+      <p:par>
+        <p:cTn id="1" dur="indefinite" restart="never" nodeType="tmRoot"/>
+      </p:par>
+    </p:tnLst>
+  </p:timing>
 </p:sld>
 </file>
 
@@ -18285,6 +18574,13 @@
   <p:transition>
     <p:cut/>
   </p:transition>
+  <p:timing>
+    <p:tnLst>
+      <p:par>
+        <p:cTn id="1" dur="indefinite" restart="never" nodeType="tmRoot"/>
+      </p:par>
+    </p:tnLst>
+  </p:timing>
 </p:sld>
 </file>
 
@@ -19209,6 +19505,13 @@
   <p:transition>
     <p:cut/>
   </p:transition>
+  <p:timing>
+    <p:tnLst>
+      <p:par>
+        <p:cTn id="1" dur="indefinite" restart="never" nodeType="tmRoot"/>
+      </p:par>
+    </p:tnLst>
+  </p:timing>
 </p:sld>
 </file>
 
@@ -19374,6 +19677,13 @@
   <p:transition>
     <p:cut/>
   </p:transition>
+  <p:timing>
+    <p:tnLst>
+      <p:par>
+        <p:cTn id="1" dur="indefinite" restart="never" nodeType="tmRoot"/>
+      </p:par>
+    </p:tnLst>
+  </p:timing>
 </p:sld>
 </file>
 
@@ -19955,6 +20265,13 @@
   <p:transition>
     <p:cut/>
   </p:transition>
+  <p:timing>
+    <p:tnLst>
+      <p:par>
+        <p:cTn id="1" dur="indefinite" restart="never" nodeType="tmRoot"/>
+      </p:par>
+    </p:tnLst>
+  </p:timing>
 </p:sld>
 </file>
 
@@ -20094,7 +20411,21 @@
                 <a:latin typeface="Courier New" panose="02070309020205020404" pitchFamily="49" charset="0"/>
                 <a:cs typeface="Courier New" panose="02070309020205020404" pitchFamily="49" charset="0"/>
               </a:rPr>
-              <a:t>             dtype = np.int32)</a:t>
+              <a:t>             </a:t>
+            </a:r>
+            <a:r>
+              <a:rPr lang="pt-BR" dirty="0" smtClean="0">
+                <a:latin typeface="Courier New" panose="02070309020205020404" pitchFamily="49" charset="0"/>
+                <a:cs typeface="Courier New" panose="02070309020205020404" pitchFamily="49" charset="0"/>
+              </a:rPr>
+              <a:t>dtype=np.int32</a:t>
+            </a:r>
+            <a:r>
+              <a:rPr lang="pt-BR" dirty="0" smtClean="0">
+                <a:latin typeface="Courier New" panose="02070309020205020404" pitchFamily="49" charset="0"/>
+                <a:cs typeface="Courier New" panose="02070309020205020404" pitchFamily="49" charset="0"/>
+              </a:rPr>
+              <a:t>)</a:t>
             </a:r>
           </a:p>
         </p:txBody>
@@ -20107,6 +20438,13 @@
   <p:transition>
     <p:cut/>
   </p:transition>
+  <p:timing>
+    <p:tnLst>
+      <p:par>
+        <p:cTn id="1" dur="indefinite" restart="never" nodeType="tmRoot"/>
+      </p:par>
+    </p:tnLst>
+  </p:timing>
 </p:sld>
 </file>
 
@@ -20610,6 +20948,13 @@
   <p:transition>
     <p:cut/>
   </p:transition>
+  <p:timing>
+    <p:tnLst>
+      <p:par>
+        <p:cTn id="1" dur="indefinite" restart="never" nodeType="tmRoot"/>
+      </p:par>
+    </p:tnLst>
+  </p:timing>
 </p:sld>
 </file>
 
@@ -21297,77 +21642,56 @@
               <a:t> </a:t>
             </a:r>
             <a:r>
-              <a:rPr sz="3200" spc="-178" dirty="0">
+              <a:rPr lang="en-GB" sz="3200" spc="40" dirty="0" smtClean="0">
                 <a:latin typeface="+mn-lt"/>
                 <a:cs typeface="Calibri" panose="020F0502020204030204" pitchFamily="34" charset="0"/>
               </a:rPr>
+              <a:t>1-D </a:t>
+            </a:r>
+            <a:r>
+              <a:rPr sz="3200" spc="-178" dirty="0" smtClean="0">
+                <a:latin typeface="+mn-lt"/>
+                <a:cs typeface="Calibri" panose="020F0502020204030204" pitchFamily="34" charset="0"/>
+              </a:rPr>
               <a:t>a</a:t>
             </a:r>
             <a:r>
-              <a:rPr sz="3200" spc="-69" dirty="0">
+              <a:rPr sz="3200" spc="-69" dirty="0" smtClean="0">
                 <a:latin typeface="+mn-lt"/>
                 <a:cs typeface="Calibri" panose="020F0502020204030204" pitchFamily="34" charset="0"/>
               </a:rPr>
               <a:t>rr</a:t>
             </a:r>
             <a:r>
-              <a:rPr sz="3200" spc="-159" dirty="0">
+              <a:rPr sz="3200" spc="-159" dirty="0" smtClean="0">
                 <a:latin typeface="+mn-lt"/>
                 <a:cs typeface="Calibri" panose="020F0502020204030204" pitchFamily="34" charset="0"/>
               </a:rPr>
               <a:t>a</a:t>
             </a:r>
             <a:r>
-              <a:rPr sz="3200" spc="-99" dirty="0">
+              <a:rPr sz="3200" spc="-99" dirty="0" smtClean="0">
                 <a:latin typeface="+mn-lt"/>
                 <a:cs typeface="Calibri" panose="020F0502020204030204" pitchFamily="34" charset="0"/>
               </a:rPr>
               <a:t>y</a:t>
             </a:r>
             <a:r>
-              <a:rPr sz="3200" spc="30" dirty="0">
+              <a:rPr sz="3200" spc="30" dirty="0" smtClean="0">
                 <a:latin typeface="+mn-lt"/>
                 <a:cs typeface="Calibri" panose="020F0502020204030204" pitchFamily="34" charset="0"/>
               </a:rPr>
               <a:t> </a:t>
             </a:r>
             <a:r>
-              <a:rPr sz="3200" spc="-89" dirty="0">
+              <a:rPr lang="en-GB" sz="3200" spc="-89" dirty="0" smtClean="0">
                 <a:latin typeface="+mn-lt"/>
                 <a:cs typeface="Calibri" panose="020F0502020204030204" pitchFamily="34" charset="0"/>
               </a:rPr>
-              <a:t>the</a:t>
-            </a:r>
-            <a:r>
-              <a:rPr sz="3200" spc="40" dirty="0">
-                <a:latin typeface="+mn-lt"/>
-                <a:cs typeface="Calibri" panose="020F0502020204030204" pitchFamily="34" charset="0"/>
-              </a:rPr>
-              <a:t> </a:t>
-            </a:r>
-            <a:r>
-              <a:rPr sz="3200" spc="-149" dirty="0">
-                <a:latin typeface="+mn-lt"/>
-                <a:cs typeface="Calibri" panose="020F0502020204030204" pitchFamily="34" charset="0"/>
-              </a:rPr>
-              <a:t>same</a:t>
-            </a:r>
-            <a:r>
-              <a:rPr sz="3200" spc="30" dirty="0">
-                <a:latin typeface="+mn-lt"/>
-                <a:cs typeface="Calibri" panose="020F0502020204030204" pitchFamily="34" charset="0"/>
-              </a:rPr>
-              <a:t> </a:t>
-            </a:r>
-            <a:r>
-              <a:rPr sz="3200" spc="-129" dirty="0">
-                <a:latin typeface="+mn-lt"/>
-                <a:cs typeface="Calibri" panose="020F0502020204030204" pitchFamily="34" charset="0"/>
-              </a:rPr>
-              <a:t>as</a:t>
-            </a:r>
-            <a:r>
-              <a:rPr sz="3200" spc="30" dirty="0">
+              <a:t>similar to</a:t>
+            </a:r>
+            <a:r>
+              <a:rPr sz="3200" spc="30" dirty="0" smtClean="0">
                 <a:latin typeface="+mn-lt"/>
                 <a:cs typeface="Calibri" panose="020F0502020204030204" pitchFamily="34" charset="0"/>
               </a:rPr>
@@ -21737,6 +22061,13 @@
   <p:transition>
     <p:cut/>
   </p:transition>
+  <p:timing>
+    <p:tnLst>
+      <p:par>
+        <p:cTn id="1" dur="indefinite" restart="never" nodeType="tmRoot"/>
+      </p:par>
+    </p:tnLst>
+  </p:timing>
 </p:sld>
 </file>
 
@@ -21778,7 +22109,7 @@
           <a:lstStyle/>
           <a:p>
             <a:r>
-              <a:rPr lang="en-US" altLang="en-US" b="1"/>
+              <a:rPr lang="en-US" altLang="en-US" b="1" dirty="0"/>
               <a:t>Array indexing</a:t>
             </a:r>
           </a:p>
@@ -21998,51 +22329,51 @@
               <a:buNone/>
             </a:pPr>
             <a:r>
-              <a:rPr lang="en-US" altLang="en-US" sz="3200">
+              <a:rPr lang="en-US" altLang="en-US" sz="3200" dirty="0">
                 <a:cs typeface="Calibri" panose="020F0502020204030204" pitchFamily="34" charset="0"/>
               </a:rPr>
               <a:t>Like lists, element addresses start with zero, so the first element of 1-D array </a:t>
             </a:r>
             <a:r>
-              <a:rPr lang="en-US" altLang="en-US" sz="3200">
+              <a:rPr lang="en-US" altLang="en-US" sz="3200" dirty="0">
                 <a:ea typeface="MS Gothic" panose="020B0609070205080204" pitchFamily="49" charset="-128"/>
                 <a:cs typeface="Calibri" panose="020F0502020204030204" pitchFamily="34" charset="0"/>
               </a:rPr>
               <a:t>a </a:t>
             </a:r>
             <a:r>
-              <a:rPr lang="en-US" altLang="en-US" sz="3200">
+              <a:rPr lang="en-US" altLang="en-US" sz="3200" dirty="0">
                 <a:cs typeface="Calibri" panose="020F0502020204030204" pitchFamily="34" charset="0"/>
               </a:rPr>
               <a:t>is </a:t>
             </a:r>
             <a:r>
-              <a:rPr lang="en-US" altLang="en-US">
+              <a:rPr lang="en-US" altLang="en-US" dirty="0">
                 <a:latin typeface="Courier New" panose="02070309020205020404" pitchFamily="49" charset="0"/>
                 <a:ea typeface="MS Gothic" panose="020B0609070205080204" pitchFamily="49" charset="-128"/>
               </a:rPr>
               <a:t>a[0], </a:t>
             </a:r>
             <a:r>
-              <a:rPr lang="en-US" altLang="en-US" sz="3200">
+              <a:rPr lang="en-US" altLang="en-US" sz="3200" dirty="0">
                 <a:cs typeface="Calibri" panose="020F0502020204030204" pitchFamily="34" charset="0"/>
               </a:rPr>
               <a:t>the second is  </a:t>
             </a:r>
             <a:r>
-              <a:rPr lang="en-US" altLang="en-US">
+              <a:rPr lang="en-US" altLang="en-US" dirty="0">
                 <a:latin typeface="Courier New" panose="02070309020205020404" pitchFamily="49" charset="0"/>
                 <a:ea typeface="MS Gothic" panose="020B0609070205080204" pitchFamily="49" charset="-128"/>
               </a:rPr>
               <a:t>a[1], </a:t>
             </a:r>
             <a:r>
-              <a:rPr lang="en-US" altLang="en-US" sz="3200">
+              <a:rPr lang="en-US" altLang="en-US" sz="3200" dirty="0">
                 <a:cs typeface="Calibri" panose="020F0502020204030204" pitchFamily="34" charset="0"/>
               </a:rPr>
               <a:t>etc.</a:t>
             </a:r>
-            <a:endParaRPr lang="en-GB" altLang="en-US" sz="3200">
+            <a:endParaRPr lang="en-GB" altLang="en-US" sz="3200" dirty="0">
               <a:cs typeface="Calibri" panose="020F0502020204030204" pitchFamily="34" charset="0"/>
             </a:endParaRPr>
           </a:p>
@@ -22057,7 +22388,7 @@
               <a:buFontTx/>
               <a:buNone/>
             </a:pPr>
-            <a:endParaRPr lang="en-US" altLang="en-US" sz="3200">
+            <a:endParaRPr lang="en-US" altLang="en-US" sz="3200" dirty="0">
               <a:cs typeface="Calibri" panose="020F0502020204030204" pitchFamily="34" charset="0"/>
             </a:endParaRPr>
           </a:p>
@@ -22073,20 +22404,20 @@
               <a:buNone/>
             </a:pPr>
             <a:r>
-              <a:rPr lang="en-US" altLang="en-US" sz="3200">
+              <a:rPr lang="en-US" altLang="en-US" sz="3200" dirty="0">
                 <a:cs typeface="Calibri" panose="020F0502020204030204" pitchFamily="34" charset="0"/>
               </a:rPr>
               <a:t>Like lists, you can reference elements starting from the end, e.g., element  </a:t>
             </a:r>
             <a:r>
-              <a:rPr lang="en-US" altLang="en-US">
+              <a:rPr lang="en-US" altLang="en-US" dirty="0">
                 <a:latin typeface="Courier New" panose="02070309020205020404" pitchFamily="49" charset="0"/>
                 <a:ea typeface="MS Gothic" panose="020B0609070205080204" pitchFamily="49" charset="-128"/>
               </a:rPr>
               <a:t>a[-1] </a:t>
             </a:r>
             <a:r>
-              <a:rPr lang="en-US" altLang="en-US" sz="3200">
+              <a:rPr lang="en-US" altLang="en-US" sz="3200" dirty="0">
                 <a:cs typeface="Calibri" panose="020F0502020204030204" pitchFamily="34" charset="0"/>
               </a:rPr>
               <a:t>is the last element in a 1-D array.</a:t>
@@ -22103,7 +22434,7 @@
               <a:buFontTx/>
               <a:buNone/>
             </a:pPr>
-            <a:endParaRPr lang="en-US" altLang="en-US" sz="3200">
+            <a:endParaRPr lang="en-US" altLang="en-US" sz="3200" dirty="0">
               <a:cs typeface="Calibri" panose="020F0502020204030204" pitchFamily="34" charset="0"/>
             </a:endParaRPr>
           </a:p>
@@ -22117,6 +22448,13 @@
   <p:transition>
     <p:cut/>
   </p:transition>
+  <p:timing>
+    <p:tnLst>
+      <p:par>
+        <p:cTn id="1" dur="indefinite" restart="never" nodeType="tmRoot"/>
+      </p:par>
+    </p:tnLst>
+  </p:timing>
 </p:sld>
 </file>
 

</xml_diff>